<commit_message>
papers and slides updated
</commit_message>
<xml_diff>
--- a/slides.pptx
+++ b/slides.pptx
@@ -5,7 +5,7 @@
     <p:sldMasterId id="2147483720" r:id="rId1"/>
   </p:sldMasterIdLst>
   <p:notesMasterIdLst>
-    <p:notesMasterId r:id="rId16"/>
+    <p:notesMasterId r:id="rId15"/>
   </p:notesMasterIdLst>
   <p:sldIdLst>
     <p:sldId id="256" r:id="rId2"/>
@@ -17,11 +17,10 @@
     <p:sldId id="283" r:id="rId8"/>
     <p:sldId id="273" r:id="rId9"/>
     <p:sldId id="274" r:id="rId10"/>
-    <p:sldId id="276" r:id="rId11"/>
-    <p:sldId id="277" r:id="rId12"/>
+    <p:sldId id="277" r:id="rId11"/>
+    <p:sldId id="275" r:id="rId12"/>
     <p:sldId id="282" r:id="rId13"/>
-    <p:sldId id="275" r:id="rId14"/>
-    <p:sldId id="278" r:id="rId15"/>
+    <p:sldId id="278" r:id="rId14"/>
   </p:sldIdLst>
   <p:sldSz cx="9144000" cy="6858000" type="screen4x3"/>
   <p:notesSz cx="6858000" cy="9144000"/>
@@ -134,10 +133,9 @@
             <p14:sldId id="283"/>
             <p14:sldId id="273"/>
             <p14:sldId id="274"/>
-            <p14:sldId id="276"/>
             <p14:sldId id="277"/>
+            <p14:sldId id="275"/>
             <p14:sldId id="282"/>
-            <p14:sldId id="275"/>
             <p14:sldId id="278"/>
           </p14:sldIdLst>
         </p14:section>
@@ -225,7 +223,8 @@
                   <c:v>SlopeOne</c:v>
                 </c:pt>
                 <c:pt idx="1">
-                  <c:v>InformationItems</c:v>
+                  <c:v>Вложенные
+Теги</c:v>
                 </c:pt>
                 <c:pt idx="2">
                   <c:v>Netflix
@@ -295,7 +294,8 @@
                   <c:v>SlopeOne</c:v>
                 </c:pt>
                 <c:pt idx="1">
-                  <c:v>InformationItems</c:v>
+                  <c:v>Вложенные
+Теги</c:v>
                 </c:pt>
                 <c:pt idx="2">
                   <c:v>Netflix
@@ -339,11 +339,11 @@
         </c:dLbls>
         <c:gapWidth val="150"/>
         <c:overlap val="100"/>
-        <c:axId val="116494336"/>
-        <c:axId val="35164160"/>
+        <c:axId val="170133376"/>
+        <c:axId val="172627840"/>
       </c:barChart>
       <c:catAx>
-        <c:axId val="116494336"/>
+        <c:axId val="170133376"/>
         <c:scaling>
           <c:orientation val="minMax"/>
         </c:scaling>
@@ -352,7 +352,7 @@
         <c:majorTickMark val="out"/>
         <c:minorTickMark val="none"/>
         <c:tickLblPos val="nextTo"/>
-        <c:crossAx val="35164160"/>
+        <c:crossAx val="172627840"/>
         <c:crosses val="autoZero"/>
         <c:auto val="1"/>
         <c:lblAlgn val="ctr"/>
@@ -360,7 +360,7 @@
         <c:noMultiLvlLbl val="0"/>
       </c:catAx>
       <c:valAx>
-        <c:axId val="35164160"/>
+        <c:axId val="172627840"/>
         <c:scaling>
           <c:orientation val="minMax"/>
           <c:max val="5"/>
@@ -372,7 +372,7 @@
         <c:majorTickMark val="out"/>
         <c:minorTickMark val="none"/>
         <c:tickLblPos val="nextTo"/>
-        <c:crossAx val="116494336"/>
+        <c:crossAx val="170133376"/>
         <c:crosses val="autoZero"/>
         <c:crossBetween val="between"/>
         <c:minorUnit val="1"/>
@@ -480,7 +480,7 @@
           <a:p>
             <a:fld id="{67C91A86-5441-47F6-8D3E-5E4E18ABE360}" type="datetimeFigureOut">
               <a:rPr lang="ru-RU" smtClean="0"/>
-              <a:t>04.05.2011</a:t>
+              <a:t>05.05.2011</a:t>
             </a:fld>
             <a:endParaRPr lang="ru-RU"/>
           </a:p>
@@ -929,7 +929,7 @@
           <a:p>
             <a:fld id="{213ECCEC-8E04-4CF6-8633-56B5E0A77197}" type="datetime1">
               <a:rPr lang="ru-RU" smtClean="0"/>
-              <a:t>04.05.2011</a:t>
+              <a:t>05.05.2011</a:t>
             </a:fld>
             <a:endParaRPr lang="ru-RU"/>
           </a:p>
@@ -1099,7 +1099,7 @@
           <a:p>
             <a:fld id="{2E6603A8-E35D-4200-8015-B24D615941D4}" type="datetime1">
               <a:rPr lang="ru-RU" smtClean="0"/>
-              <a:t>04.05.2011</a:t>
+              <a:t>05.05.2011</a:t>
             </a:fld>
             <a:endParaRPr lang="ru-RU"/>
           </a:p>
@@ -1279,7 +1279,7 @@
           <a:p>
             <a:fld id="{B1004C43-31A3-4172-9A99-2EC012F9BEA3}" type="datetime1">
               <a:rPr lang="ru-RU" smtClean="0"/>
-              <a:t>04.05.2011</a:t>
+              <a:t>05.05.2011</a:t>
             </a:fld>
             <a:endParaRPr lang="ru-RU"/>
           </a:p>
@@ -1449,7 +1449,7 @@
           <a:p>
             <a:fld id="{54303ED9-D49E-4859-9055-A17C4B6BBBF2}" type="datetime1">
               <a:rPr lang="ru-RU" smtClean="0"/>
-              <a:t>04.05.2011</a:t>
+              <a:t>05.05.2011</a:t>
             </a:fld>
             <a:endParaRPr lang="ru-RU"/>
           </a:p>
@@ -1695,7 +1695,7 @@
           <a:p>
             <a:fld id="{22D0B91C-7E08-4301-B201-427BB408C90C}" type="datetime1">
               <a:rPr lang="ru-RU" smtClean="0"/>
-              <a:t>04.05.2011</a:t>
+              <a:t>05.05.2011</a:t>
             </a:fld>
             <a:endParaRPr lang="ru-RU"/>
           </a:p>
@@ -1983,7 +1983,7 @@
           <a:p>
             <a:fld id="{FAC5777C-00D6-4151-99C2-1109AF848B66}" type="datetime1">
               <a:rPr lang="ru-RU" smtClean="0"/>
-              <a:t>04.05.2011</a:t>
+              <a:t>05.05.2011</a:t>
             </a:fld>
             <a:endParaRPr lang="ru-RU"/>
           </a:p>
@@ -2405,7 +2405,7 @@
           <a:p>
             <a:fld id="{D0450615-B923-461F-B86A-44BECAFF3A68}" type="datetime1">
               <a:rPr lang="ru-RU" smtClean="0"/>
-              <a:t>04.05.2011</a:t>
+              <a:t>05.05.2011</a:t>
             </a:fld>
             <a:endParaRPr lang="ru-RU"/>
           </a:p>
@@ -2523,7 +2523,7 @@
           <a:p>
             <a:fld id="{1C7CEDB4-570B-4941-AB30-185299BFD713}" type="datetime1">
               <a:rPr lang="ru-RU" smtClean="0"/>
-              <a:t>04.05.2011</a:t>
+              <a:t>05.05.2011</a:t>
             </a:fld>
             <a:endParaRPr lang="ru-RU"/>
           </a:p>
@@ -2618,7 +2618,7 @@
           <a:p>
             <a:fld id="{B5106DB6-3B78-4694-8647-46252A9B37D0}" type="datetime1">
               <a:rPr lang="ru-RU" smtClean="0"/>
-              <a:t>04.05.2011</a:t>
+              <a:t>05.05.2011</a:t>
             </a:fld>
             <a:endParaRPr lang="ru-RU"/>
           </a:p>
@@ -2895,7 +2895,7 @@
           <a:p>
             <a:fld id="{A02C3694-482A-4D54-A276-5C72D1324954}" type="datetime1">
               <a:rPr lang="ru-RU" smtClean="0"/>
-              <a:t>04.05.2011</a:t>
+              <a:t>05.05.2011</a:t>
             </a:fld>
             <a:endParaRPr lang="ru-RU"/>
           </a:p>
@@ -3148,7 +3148,7 @@
           <a:p>
             <a:fld id="{2C52DEBC-865F-4005-AD89-C7D580DA13ED}" type="datetime1">
               <a:rPr lang="ru-RU" smtClean="0"/>
-              <a:t>04.05.2011</a:t>
+              <a:t>05.05.2011</a:t>
             </a:fld>
             <a:endParaRPr lang="ru-RU"/>
           </a:p>
@@ -3361,7 +3361,7 @@
           <a:p>
             <a:fld id="{97CDA6B0-9F2F-4E6B-806E-559C2E8A8581}" type="datetime1">
               <a:rPr lang="ru-RU" smtClean="0"/>
-              <a:t>04.05.2011</a:t>
+              <a:t>05.05.2011</a:t>
             </a:fld>
             <a:endParaRPr lang="ru-RU"/>
           </a:p>
@@ -3747,7 +3747,12 @@
             <p:ph type="ctrTitle"/>
           </p:nvPr>
         </p:nvSpPr>
-        <p:spPr/>
+        <p:spPr>
+          <a:xfrm>
+            <a:off x="685800" y="1382911"/>
+            <a:ext cx="7772400" cy="1470025"/>
+          </a:xfrm>
+        </p:spPr>
         <p:txBody>
           <a:bodyPr>
             <a:normAutofit/>
@@ -3772,66 +3777,142 @@
             <p:ph type="subTitle" idx="1"/>
           </p:nvPr>
         </p:nvSpPr>
-        <p:spPr/>
+        <p:spPr>
+          <a:xfrm>
+            <a:off x="5004048" y="3573016"/>
+            <a:ext cx="3600400" cy="1752600"/>
+          </a:xfrm>
+        </p:spPr>
         <p:txBody>
           <a:bodyPr>
-            <a:normAutofit fontScale="70000" lnSpcReduction="20000"/>
+            <a:noAutofit/>
           </a:bodyPr>
           <a:lstStyle/>
           <a:p>
-            <a:endParaRPr lang="ru-RU" dirty="0" smtClean="0"/>
-          </a:p>
-          <a:p>
-            <a:r>
-              <a:rPr lang="ru-RU" dirty="0" smtClean="0"/>
+            <a:pPr algn="l"/>
+            <a:r>
+              <a:rPr lang="ru-RU" sz="2000" dirty="0" smtClean="0">
+                <a:solidFill>
+                  <a:schemeClr val="tx1"/>
+                </a:solidFill>
+              </a:rPr>
+              <a:t>Исполнил</a:t>
+            </a:r>
+            <a:r>
+              <a:rPr lang="en-US" sz="2000" dirty="0" smtClean="0">
+                <a:solidFill>
+                  <a:schemeClr val="tx1"/>
+                </a:solidFill>
+              </a:rPr>
+              <a:t>: </a:t>
+            </a:r>
+            <a:r>
+              <a:rPr lang="ru-RU" sz="2000" dirty="0">
+                <a:solidFill>
+                  <a:schemeClr val="tx1"/>
+                </a:solidFill>
+              </a:rPr>
+              <a:t/>
+            </a:r>
+            <a:br>
+              <a:rPr lang="ru-RU" sz="2000" dirty="0">
+                <a:solidFill>
+                  <a:schemeClr val="tx1"/>
+                </a:solidFill>
+              </a:rPr>
+            </a:br>
+            <a:r>
+              <a:rPr lang="ru-RU" sz="2000" dirty="0">
+                <a:solidFill>
+                  <a:schemeClr val="tx1"/>
+                </a:solidFill>
+              </a:rPr>
+              <a:t>	</a:t>
+            </a:r>
+            <a:r>
+              <a:rPr lang="ru-RU" sz="2000" dirty="0" smtClean="0">
+                <a:solidFill>
+                  <a:schemeClr val="tx1"/>
+                </a:solidFill>
+              </a:rPr>
               <a:t>Антон </a:t>
             </a:r>
             <a:r>
-              <a:rPr lang="ru-RU" dirty="0" err="1" smtClean="0"/>
+              <a:rPr lang="ru-RU" sz="2000" dirty="0" err="1" smtClean="0">
+                <a:solidFill>
+                  <a:schemeClr val="tx1"/>
+                </a:solidFill>
+              </a:rPr>
               <a:t>Чеботаев</a:t>
             </a:r>
-            <a:endParaRPr lang="ru-RU" dirty="0" smtClean="0"/>
-          </a:p>
-          <a:p>
-            <a:r>
-              <a:rPr lang="ru-RU" dirty="0" smtClean="0"/>
-              <a:t>СПбГУ ИТМО, </a:t>
-            </a:r>
-            <a:r>
-              <a:rPr lang="ru-RU" dirty="0" err="1" smtClean="0"/>
-              <a:t>ИТиП</a:t>
-            </a:r>
-            <a:r>
-              <a:rPr lang="ru-RU" dirty="0" smtClean="0"/>
-              <a:t>, КТ</a:t>
-            </a:r>
-          </a:p>
-          <a:p>
-            <a:r>
-              <a:rPr lang="ru-RU" dirty="0" smtClean="0"/>
+            <a:endParaRPr lang="ru-RU" sz="2000" dirty="0" smtClean="0">
+              <a:solidFill>
+                <a:schemeClr val="tx1"/>
+              </a:solidFill>
+            </a:endParaRPr>
+          </a:p>
+          <a:p>
+            <a:pPr algn="l"/>
+            <a:r>
+              <a:rPr lang="ru-RU" sz="2000" dirty="0" smtClean="0">
+                <a:solidFill>
+                  <a:schemeClr val="tx1"/>
+                </a:solidFill>
+              </a:rPr>
               <a:t>Научный руководитель:</a:t>
             </a:r>
-          </a:p>
-          <a:p>
-            <a:r>
-              <a:rPr lang="ru-RU" dirty="0" err="1" smtClean="0"/>
+            <a:br>
+              <a:rPr lang="ru-RU" sz="2000" dirty="0" smtClean="0">
+                <a:solidFill>
+                  <a:schemeClr val="tx1"/>
+                </a:solidFill>
+              </a:rPr>
+            </a:br>
+            <a:r>
+              <a:rPr lang="ru-RU" sz="2000" dirty="0" smtClean="0">
+                <a:solidFill>
+                  <a:schemeClr val="tx1"/>
+                </a:solidFill>
+              </a:rPr>
+              <a:t>	</a:t>
+            </a:r>
+            <a:r>
+              <a:rPr lang="ru-RU" sz="2000" dirty="0" err="1" smtClean="0">
+                <a:solidFill>
+                  <a:schemeClr val="tx1"/>
+                </a:solidFill>
+              </a:rPr>
               <a:t>Бухановский</a:t>
             </a:r>
             <a:r>
-              <a:rPr lang="ru-RU" dirty="0" smtClean="0"/>
-              <a:t> А.В., </a:t>
-            </a:r>
-            <a:r>
-              <a:rPr lang="ru-RU" dirty="0" err="1" smtClean="0"/>
+              <a:rPr lang="ru-RU" sz="2000" dirty="0" smtClean="0">
+                <a:solidFill>
+                  <a:schemeClr val="tx1"/>
+                </a:solidFill>
+              </a:rPr>
+              <a:t> </a:t>
+            </a:r>
+            <a:r>
+              <a:rPr lang="ru-RU" sz="2000" dirty="0" smtClean="0">
+                <a:solidFill>
+                  <a:schemeClr val="tx1"/>
+                </a:solidFill>
+              </a:rPr>
+              <a:t>А.В., </a:t>
+            </a:r>
+            <a:r>
+              <a:rPr lang="ru-RU" sz="2000" dirty="0" err="1" smtClean="0">
+                <a:solidFill>
+                  <a:schemeClr val="tx1"/>
+                </a:solidFill>
+              </a:rPr>
               <a:t>д.т.н</a:t>
             </a:r>
-            <a:r>
-              <a:rPr lang="ru-RU" dirty="0" smtClean="0"/>
-              <a:t>, проф. каф. ИС СПбГУ ИТМО</a:t>
-            </a:r>
-          </a:p>
-          <a:p>
-            <a:endParaRPr lang="ru-RU" dirty="0"/>
+            <a:endParaRPr lang="ru-RU" sz="2000" dirty="0" smtClean="0">
+              <a:solidFill>
+                <a:schemeClr val="tx1"/>
+              </a:solidFill>
+            </a:endParaRPr>
           </a:p>
         </p:txBody>
       </p:sp>
@@ -3843,8 +3924,8 @@
         </p:nvSpPr>
         <p:spPr>
           <a:xfrm>
-            <a:off x="4283968" y="6196662"/>
-            <a:ext cx="833049" cy="369332"/>
+            <a:off x="4121605" y="6267986"/>
+            <a:ext cx="994183" cy="338554"/>
           </a:xfrm>
           <a:prstGeom prst="rect">
             <a:avLst/>
@@ -3858,22 +3939,44 @@
           <a:lstStyle/>
           <a:p>
             <a:r>
-              <a:rPr lang="ru-RU" dirty="0" smtClean="0">
-                <a:solidFill>
-                  <a:schemeClr val="bg1">
-                    <a:lumMod val="65000"/>
-                  </a:schemeClr>
-                </a:solidFill>
-              </a:rPr>
-              <a:t>2011 г.</a:t>
-            </a:r>
-            <a:endParaRPr lang="ru-RU" dirty="0">
-              <a:solidFill>
-                <a:schemeClr val="bg1">
-                  <a:lumMod val="65000"/>
-                </a:schemeClr>
-              </a:solidFill>
-            </a:endParaRPr>
+              <a:rPr lang="ru-RU" sz="1600" dirty="0" smtClean="0"/>
+              <a:t>СПб 2011</a:t>
+            </a:r>
+            <a:endParaRPr lang="ru-RU" sz="1600" dirty="0"/>
+          </a:p>
+        </p:txBody>
+      </p:sp>
+      <p:sp>
+        <p:nvSpPr>
+          <p:cNvPr id="7" name="TextBox 6"/>
+          <p:cNvSpPr txBox="1"/>
+          <p:nvPr/>
+        </p:nvSpPr>
+        <p:spPr>
+          <a:xfrm>
+            <a:off x="2350705" y="5877272"/>
+            <a:ext cx="4535985" cy="369332"/>
+          </a:xfrm>
+          <a:prstGeom prst="rect">
+            <a:avLst/>
+          </a:prstGeom>
+          <a:noFill/>
+        </p:spPr>
+        <p:txBody>
+          <a:bodyPr wrap="none" rtlCol="0">
+            <a:spAutoFit/>
+          </a:bodyPr>
+          <a:lstStyle/>
+          <a:p>
+            <a:r>
+              <a:rPr lang="ru-RU" dirty="0"/>
+              <a:t>Кафедра Компьютерных Технологий, </a:t>
+            </a:r>
+            <a:r>
+              <a:rPr lang="ru-RU" dirty="0" err="1" smtClean="0"/>
+              <a:t>ФИТиП</a:t>
+            </a:r>
+            <a:endParaRPr lang="ru-RU" dirty="0"/>
           </a:p>
         </p:txBody>
       </p:sp>
@@ -3937,106 +4040,34 @@
           </a:p>
         </p:txBody>
       </p:sp>
-      <p:sp>
-        <p:nvSpPr>
-          <p:cNvPr id="3" name="Объект 2"/>
-          <p:cNvSpPr>
-            <a:spLocks noGrp="1"/>
-          </p:cNvSpPr>
+      <p:graphicFrame>
+        <p:nvGraphicFramePr>
+          <p:cNvPr id="4" name="Объект 3"/>
+          <p:cNvGraphicFramePr>
+            <a:graphicFrameLocks noGrp="1"/>
+          </p:cNvGraphicFramePr>
           <p:nvPr>
             <p:ph idx="1"/>
-          </p:nvPr>
-        </p:nvSpPr>
-        <p:spPr/>
-        <p:txBody>
-          <a:bodyPr/>
-          <a:lstStyle/>
-          <a:p>
-            <a:r>
-              <a:rPr lang="ru-RU" dirty="0" smtClean="0"/>
-              <a:t>Данные </a:t>
-            </a:r>
-            <a:r>
-              <a:rPr lang="en-US" dirty="0" err="1" smtClean="0"/>
-              <a:t>MovieLens</a:t>
-            </a:r>
-            <a:endParaRPr lang="ru-RU" dirty="0" smtClean="0"/>
-          </a:p>
-          <a:p>
-            <a:pPr lvl="1"/>
-            <a:r>
-              <a:rPr lang="ru-RU" dirty="0" smtClean="0"/>
-              <a:t>1 000 000 рейтингов</a:t>
-            </a:r>
-            <a:endParaRPr lang="en-US" dirty="0" smtClean="0"/>
-          </a:p>
-          <a:p>
-            <a:pPr lvl="1"/>
-            <a:r>
-              <a:rPr lang="en-US" dirty="0" smtClean="0"/>
-              <a:t>6</a:t>
-            </a:r>
-            <a:r>
-              <a:rPr lang="ru-RU" dirty="0" smtClean="0"/>
-              <a:t> </a:t>
-            </a:r>
-            <a:r>
-              <a:rPr lang="en-US" dirty="0" smtClean="0"/>
-              <a:t>0</a:t>
-            </a:r>
-            <a:r>
-              <a:rPr lang="ru-RU" dirty="0" smtClean="0"/>
-              <a:t>0</a:t>
-            </a:r>
-            <a:r>
-              <a:rPr lang="en-US" dirty="0" smtClean="0"/>
-              <a:t>0 </a:t>
-            </a:r>
-            <a:r>
-              <a:rPr lang="ru-RU" dirty="0" smtClean="0"/>
-              <a:t>пользователей</a:t>
-            </a:r>
-          </a:p>
-          <a:p>
-            <a:pPr lvl="1"/>
-            <a:r>
-              <a:rPr lang="ru-RU" dirty="0" smtClean="0"/>
-              <a:t>100 000 ключевых слов</a:t>
-            </a:r>
-          </a:p>
-          <a:p>
-            <a:pPr lvl="1"/>
-            <a:r>
-              <a:rPr lang="ru-RU" dirty="0" smtClean="0"/>
-              <a:t>3 900 фильмов</a:t>
-            </a:r>
-            <a:endParaRPr lang="en-US" dirty="0"/>
-          </a:p>
-          <a:p>
-            <a:r>
-              <a:rPr lang="ru-RU" dirty="0" smtClean="0"/>
-              <a:t>Методика</a:t>
-            </a:r>
-          </a:p>
-          <a:p>
-            <a:pPr lvl="1"/>
-            <a:r>
-              <a:rPr lang="ru-RU" dirty="0" smtClean="0"/>
-              <a:t>Обучающий набор: 80%, проверочный: 20%</a:t>
-            </a:r>
-          </a:p>
-          <a:p>
-            <a:pPr lvl="1"/>
-            <a:r>
-              <a:rPr lang="ru-RU" dirty="0" smtClean="0"/>
-              <a:t>Измерение средней квадратичной ошибки</a:t>
-            </a:r>
-          </a:p>
-        </p:txBody>
-      </p:sp>
-      <p:sp>
-        <p:nvSpPr>
-          <p:cNvPr id="13" name="Номер слайда 12"/>
+            <p:extLst>
+              <p:ext uri="{D42A27DB-BD31-4B8C-83A1-F6EECF244321}">
+                <p14:modId xmlns:p14="http://schemas.microsoft.com/office/powerpoint/2010/main" val="3014311609"/>
+              </p:ext>
+            </p:extLst>
+          </p:nvPr>
+        </p:nvGraphicFramePr>
+        <p:xfrm>
+          <a:off x="457200" y="1600201"/>
+          <a:ext cx="8229600" cy="4061047"/>
+        </p:xfrm>
+        <a:graphic>
+          <a:graphicData uri="http://schemas.openxmlformats.org/drawingml/2006/chart">
+            <c:chart xmlns:c="http://schemas.openxmlformats.org/drawingml/2006/chart" xmlns:r="http://schemas.openxmlformats.org/officeDocument/2006/relationships" r:id="rId2"/>
+          </a:graphicData>
+        </a:graphic>
+      </p:graphicFrame>
+      <p:sp>
+        <p:nvSpPr>
+          <p:cNvPr id="5" name="Номер слайда 4"/>
           <p:cNvSpPr>
             <a:spLocks noGrp="1"/>
           </p:cNvSpPr>
@@ -4057,10 +4088,69 @@
           </a:p>
         </p:txBody>
       </p:sp>
+      <p:sp>
+        <p:nvSpPr>
+          <p:cNvPr id="6" name="TextBox 5"/>
+          <p:cNvSpPr txBox="1"/>
+          <p:nvPr/>
+        </p:nvSpPr>
+        <p:spPr>
+          <a:xfrm>
+            <a:off x="323528" y="5805264"/>
+            <a:ext cx="8428269" cy="369332"/>
+          </a:xfrm>
+          <a:prstGeom prst="rect">
+            <a:avLst/>
+          </a:prstGeom>
+          <a:noFill/>
+        </p:spPr>
+        <p:txBody>
+          <a:bodyPr wrap="none" rtlCol="0">
+            <a:spAutoFit/>
+          </a:bodyPr>
+          <a:lstStyle/>
+          <a:p>
+            <a:pPr marL="0" lvl="1"/>
+            <a:r>
+              <a:rPr lang="ru-RU" dirty="0" smtClean="0"/>
+              <a:t>1000000 рейтингов     </a:t>
+            </a:r>
+            <a:r>
+              <a:rPr lang="en-US" dirty="0" smtClean="0"/>
+              <a:t>60</a:t>
+            </a:r>
+            <a:r>
+              <a:rPr lang="ru-RU" dirty="0"/>
+              <a:t>0</a:t>
+            </a:r>
+            <a:r>
+              <a:rPr lang="en-US" dirty="0"/>
+              <a:t>0 </a:t>
+            </a:r>
+            <a:r>
+              <a:rPr lang="ru-RU" dirty="0"/>
+              <a:t>пользователей </a:t>
+            </a:r>
+            <a:r>
+              <a:rPr lang="ru-RU" dirty="0" smtClean="0"/>
+              <a:t>    100000 </a:t>
+            </a:r>
+            <a:r>
+              <a:rPr lang="ru-RU" dirty="0"/>
+              <a:t>ключевых </a:t>
+            </a:r>
+            <a:r>
+              <a:rPr lang="ru-RU" dirty="0" smtClean="0"/>
+              <a:t>слов    3900 фильмов</a:t>
+            </a:r>
+            <a:endParaRPr lang="en-US" dirty="0"/>
+          </a:p>
+        </p:txBody>
+      </p:sp>
     </p:spTree>
     <p:extLst>
       <p:ext uri="{BB962C8B-B14F-4D97-AF65-F5344CB8AC3E}">
-        <p14:creationId xmlns:p14="http://schemas.microsoft.com/office/powerpoint/2010/main" val="1137543791"/>
+        <p14:creationId xmlns:p14="http://schemas.microsoft.com/office/powerpoint/2010/main" val="2575376474"/>
       </p:ext>
     </p:extLst>
   </p:cSld>
@@ -4111,40 +4201,117 @@
           <a:p>
             <a:r>
               <a:rPr lang="ru-RU" dirty="0" smtClean="0"/>
-              <a:t>Качество рекомендаций</a:t>
+              <a:t>Преимущества</a:t>
             </a:r>
             <a:endParaRPr lang="ru-RU" dirty="0"/>
           </a:p>
         </p:txBody>
       </p:sp>
-      <p:graphicFrame>
-        <p:nvGraphicFramePr>
-          <p:cNvPr id="4" name="Объект 3"/>
-          <p:cNvGraphicFramePr>
-            <a:graphicFrameLocks noGrp="1"/>
-          </p:cNvGraphicFramePr>
+      <p:sp>
+        <p:nvSpPr>
+          <p:cNvPr id="3" name="Объект 2"/>
+          <p:cNvSpPr>
+            <a:spLocks noGrp="1"/>
+          </p:cNvSpPr>
           <p:nvPr>
             <p:ph idx="1"/>
-            <p:extLst>
-              <p:ext uri="{D42A27DB-BD31-4B8C-83A1-F6EECF244321}">
-                <p14:modId xmlns:p14="http://schemas.microsoft.com/office/powerpoint/2010/main" val="9662927"/>
-              </p:ext>
-            </p:extLst>
-          </p:nvPr>
-        </p:nvGraphicFramePr>
-        <p:xfrm>
-          <a:off x="457200" y="1600200"/>
-          <a:ext cx="8229600" cy="4525963"/>
-        </p:xfrm>
-        <a:graphic>
-          <a:graphicData uri="http://schemas.openxmlformats.org/drawingml/2006/chart">
-            <c:chart xmlns:c="http://schemas.openxmlformats.org/drawingml/2006/chart" xmlns:r="http://schemas.openxmlformats.org/officeDocument/2006/relationships" r:id="rId2"/>
-          </a:graphicData>
-        </a:graphic>
-      </p:graphicFrame>
-      <p:sp>
-        <p:nvSpPr>
-          <p:cNvPr id="5" name="Номер слайда 4"/>
+          </p:nvPr>
+        </p:nvSpPr>
+        <p:spPr/>
+        <p:txBody>
+          <a:bodyPr/>
+          <a:lstStyle/>
+          <a:p>
+            <a:pPr>
+              <a:buClr>
+                <a:srgbClr val="00B050"/>
+              </a:buClr>
+              <a:buFont typeface="Wingdings" pitchFamily="2" charset="2"/>
+              <a:buChar char="ü"/>
+            </a:pPr>
+            <a:r>
+              <a:rPr lang="ru-RU" dirty="0" smtClean="0"/>
+              <a:t> Единый формат</a:t>
+            </a:r>
+          </a:p>
+          <a:p>
+            <a:pPr>
+              <a:buClr>
+                <a:srgbClr val="00B050"/>
+              </a:buClr>
+              <a:buFont typeface="Wingdings" pitchFamily="2" charset="2"/>
+              <a:buChar char="ü"/>
+            </a:pPr>
+            <a:r>
+              <a:rPr lang="ru-RU" dirty="0" smtClean="0"/>
+              <a:t> Адаптивность</a:t>
+            </a:r>
+          </a:p>
+          <a:p>
+            <a:pPr>
+              <a:buClr>
+                <a:srgbClr val="00B050"/>
+              </a:buClr>
+              <a:buFont typeface="Wingdings" pitchFamily="2" charset="2"/>
+              <a:buChar char="ü"/>
+            </a:pPr>
+            <a:r>
+              <a:rPr lang="ru-RU" dirty="0" smtClean="0"/>
+              <a:t> Не требователен к ресурсам</a:t>
+            </a:r>
+          </a:p>
+          <a:p>
+            <a:pPr>
+              <a:buClr>
+                <a:srgbClr val="00B050"/>
+              </a:buClr>
+              <a:buFont typeface="Wingdings" pitchFamily="2" charset="2"/>
+              <a:buChar char="ü"/>
+            </a:pPr>
+            <a:r>
+              <a:rPr lang="ru-RU" dirty="0" smtClean="0"/>
+              <a:t> Быстрое время пересчета</a:t>
+            </a:r>
+          </a:p>
+          <a:p>
+            <a:pPr>
+              <a:buClr>
+                <a:srgbClr val="00B050"/>
+              </a:buClr>
+              <a:buFont typeface="Wingdings" pitchFamily="2" charset="2"/>
+              <a:buChar char="ü"/>
+            </a:pPr>
+            <a:r>
+              <a:rPr lang="ru-RU" dirty="0"/>
+              <a:t> </a:t>
+            </a:r>
+            <a:r>
+              <a:rPr lang="ru-RU" dirty="0" smtClean="0"/>
+              <a:t>Возможность группировки и уточнения рекомендаций</a:t>
+            </a:r>
+          </a:p>
+          <a:p>
+            <a:pPr>
+              <a:buClr>
+                <a:srgbClr val="00B050"/>
+              </a:buClr>
+              <a:buFont typeface="Wingdings" pitchFamily="2" charset="2"/>
+              <a:buChar char="ü"/>
+            </a:pPr>
+            <a:r>
+              <a:rPr lang="ru-RU" dirty="0"/>
+              <a:t> </a:t>
+            </a:r>
+            <a:r>
+              <a:rPr lang="ru-RU" dirty="0" smtClean="0"/>
+              <a:t>Возможность обоснования рекомендаций</a:t>
+            </a:r>
+          </a:p>
+        </p:txBody>
+      </p:sp>
+      <p:sp>
+        <p:nvSpPr>
+          <p:cNvPr id="4" name="Номер слайда 3"/>
           <p:cNvSpPr>
             <a:spLocks noGrp="1"/>
           </p:cNvSpPr>
@@ -4168,7 +4335,7 @@
     </p:spTree>
     <p:extLst>
       <p:ext uri="{BB962C8B-B14F-4D97-AF65-F5344CB8AC3E}">
-        <p14:creationId xmlns:p14="http://schemas.microsoft.com/office/powerpoint/2010/main" val="2575376474"/>
+        <p14:creationId xmlns:p14="http://schemas.microsoft.com/office/powerpoint/2010/main" val="175482726"/>
       </p:ext>
     </p:extLst>
   </p:cSld>
@@ -4333,173 +4500,6 @@
           <a:p>
             <a:r>
               <a:rPr lang="ru-RU" dirty="0" smtClean="0"/>
-              <a:t>Преимущества</a:t>
-            </a:r>
-            <a:endParaRPr lang="ru-RU" dirty="0"/>
-          </a:p>
-        </p:txBody>
-      </p:sp>
-      <p:sp>
-        <p:nvSpPr>
-          <p:cNvPr id="3" name="Объект 2"/>
-          <p:cNvSpPr>
-            <a:spLocks noGrp="1"/>
-          </p:cNvSpPr>
-          <p:nvPr>
-            <p:ph idx="1"/>
-          </p:nvPr>
-        </p:nvSpPr>
-        <p:spPr/>
-        <p:txBody>
-          <a:bodyPr/>
-          <a:lstStyle/>
-          <a:p>
-            <a:pPr>
-              <a:buFont typeface="Wingdings" pitchFamily="2" charset="2"/>
-              <a:buChar char="ü"/>
-            </a:pPr>
-            <a:r>
-              <a:rPr lang="ru-RU" dirty="0" smtClean="0"/>
-              <a:t> Единый формат</a:t>
-            </a:r>
-          </a:p>
-          <a:p>
-            <a:pPr>
-              <a:buFont typeface="Wingdings" pitchFamily="2" charset="2"/>
-              <a:buChar char="ü"/>
-            </a:pPr>
-            <a:r>
-              <a:rPr lang="ru-RU" dirty="0" smtClean="0"/>
-              <a:t> Адаптивность</a:t>
-            </a:r>
-          </a:p>
-          <a:p>
-            <a:pPr>
-              <a:buFont typeface="Wingdings" pitchFamily="2" charset="2"/>
-              <a:buChar char="ü"/>
-            </a:pPr>
-            <a:r>
-              <a:rPr lang="ru-RU" dirty="0" smtClean="0"/>
-              <a:t> Не требователен к ресурсам</a:t>
-            </a:r>
-          </a:p>
-          <a:p>
-            <a:pPr>
-              <a:buFont typeface="Wingdings" pitchFamily="2" charset="2"/>
-              <a:buChar char="ü"/>
-            </a:pPr>
-            <a:r>
-              <a:rPr lang="ru-RU" dirty="0" smtClean="0"/>
-              <a:t> Быстрое время пересчета</a:t>
-            </a:r>
-          </a:p>
-          <a:p>
-            <a:pPr>
-              <a:buFont typeface="Wingdings" pitchFamily="2" charset="2"/>
-              <a:buChar char="ü"/>
-            </a:pPr>
-            <a:r>
-              <a:rPr lang="ru-RU" dirty="0"/>
-              <a:t> </a:t>
-            </a:r>
-            <a:r>
-              <a:rPr lang="ru-RU" dirty="0" smtClean="0"/>
-              <a:t>Возможность группировки и уточнения рекомендаций</a:t>
-            </a:r>
-          </a:p>
-          <a:p>
-            <a:pPr>
-              <a:buFont typeface="Wingdings" pitchFamily="2" charset="2"/>
-              <a:buChar char="ü"/>
-            </a:pPr>
-            <a:r>
-              <a:rPr lang="ru-RU" dirty="0"/>
-              <a:t> </a:t>
-            </a:r>
-            <a:r>
-              <a:rPr lang="ru-RU" dirty="0" smtClean="0"/>
-              <a:t>Возможность обоснования рекомендаций</a:t>
-            </a:r>
-          </a:p>
-        </p:txBody>
-      </p:sp>
-      <p:sp>
-        <p:nvSpPr>
-          <p:cNvPr id="4" name="Номер слайда 3"/>
-          <p:cNvSpPr>
-            <a:spLocks noGrp="1"/>
-          </p:cNvSpPr>
-          <p:nvPr>
-            <p:ph type="sldNum" sz="quarter" idx="12"/>
-          </p:nvPr>
-        </p:nvSpPr>
-        <p:spPr/>
-        <p:txBody>
-          <a:bodyPr/>
-          <a:lstStyle/>
-          <a:p>
-            <a:fld id="{3D103F3D-DAC2-4AB8-B408-6D79DB8C6F40}" type="slidenum">
-              <a:rPr lang="ru-RU" smtClean="0"/>
-              <a:t>13</a:t>
-            </a:fld>
-            <a:endParaRPr lang="ru-RU"/>
-          </a:p>
-        </p:txBody>
-      </p:sp>
-    </p:spTree>
-    <p:extLst>
-      <p:ext uri="{BB962C8B-B14F-4D97-AF65-F5344CB8AC3E}">
-        <p14:creationId xmlns:p14="http://schemas.microsoft.com/office/powerpoint/2010/main" val="175482726"/>
-      </p:ext>
-    </p:extLst>
-  </p:cSld>
-  <p:clrMapOvr>
-    <a:masterClrMapping/>
-  </p:clrMapOvr>
-  <p:timing>
-    <p:tnLst>
-      <p:par>
-        <p:cTn id="1" dur="indefinite" restart="never" nodeType="tmRoot"/>
-      </p:par>
-    </p:tnLst>
-  </p:timing>
-</p:sld>
-</file>
-
-<file path=ppt/slides/slide14.xml><?xml version="1.0" encoding="utf-8"?>
-<p:sld xmlns:a="http://schemas.openxmlformats.org/drawingml/2006/main" xmlns:r="http://schemas.openxmlformats.org/officeDocument/2006/relationships" xmlns:p="http://schemas.openxmlformats.org/presentationml/2006/main">
-  <p:cSld>
-    <p:spTree>
-      <p:nvGrpSpPr>
-        <p:cNvPr id="1" name=""/>
-        <p:cNvGrpSpPr/>
-        <p:nvPr/>
-      </p:nvGrpSpPr>
-      <p:grpSpPr>
-        <a:xfrm>
-          <a:off x="0" y="0"/>
-          <a:ext cx="0" cy="0"/>
-          <a:chOff x="0" y="0"/>
-          <a:chExt cx="0" cy="0"/>
-        </a:xfrm>
-      </p:grpSpPr>
-      <p:sp>
-        <p:nvSpPr>
-          <p:cNvPr id="2" name="Заголовок 1"/>
-          <p:cNvSpPr>
-            <a:spLocks noGrp="1"/>
-          </p:cNvSpPr>
-          <p:nvPr>
-            <p:ph type="title"/>
-          </p:nvPr>
-        </p:nvSpPr>
-        <p:spPr/>
-        <p:txBody>
-          <a:bodyPr/>
-          <a:lstStyle/>
-          <a:p>
-            <a:r>
-              <a:rPr lang="ru-RU" dirty="0" smtClean="0"/>
               <a:t>Выводы</a:t>
             </a:r>
             <a:endParaRPr lang="ru-RU" dirty="0"/>
@@ -4573,7 +4573,7 @@
           <a:p>
             <a:fld id="{3D103F3D-DAC2-4AB8-B408-6D79DB8C6F40}" type="slidenum">
               <a:rPr lang="ru-RU" smtClean="0"/>
-              <a:t>14</a:t>
+              <a:t>13</a:t>
             </a:fld>
             <a:endParaRPr lang="ru-RU"/>
           </a:p>
@@ -4616,8 +4616,8 @@
           <a:chExt cx="0" cy="0"/>
         </a:xfrm>
       </p:grpSpPr>
-      <mc:AlternateContent xmlns:mc="http://schemas.openxmlformats.org/markup-compatibility/2006">
-        <mc:Choice xmlns:a14="http://schemas.microsoft.com/office/drawing/2010/main" Requires="a14">
+      <mc:AlternateContent xmlns:mc="http://schemas.openxmlformats.org/markup-compatibility/2006" xmlns:a14="http://schemas.microsoft.com/office/drawing/2010/main">
+        <mc:Choice Requires="a14">
           <p:sp>
             <p:nvSpPr>
               <p:cNvPr id="8" name="Объект 7"/>
@@ -4747,11 +4747,7 @@
               <a:p>
                 <a:r>
                   <a:rPr lang="ru-RU" dirty="0" smtClean="0"/>
-                  <a:t>Основная задача рекомендательной системы —</a:t>
-                </a:r>
-                <a:r>
-                  <a:rPr lang="ru-RU" dirty="0" smtClean="0"/>
-                  <a:t>предсказать </a:t>
+                  <a:t>Основная задача рекомендательной системы —предсказать </a:t>
                 </a:r>
                 <a14:m>
                   <m:oMath xmlns:m="http://schemas.openxmlformats.org/officeDocument/2006/math">
@@ -4798,7 +4794,7 @@
             </p:txBody>
           </p:sp>
         </mc:Choice>
-        <mc:Fallback>
+        <mc:Fallback xmlns="">
           <p:sp>
             <p:nvSpPr>
               <p:cNvPr id="8" name="Объект 7"/>
@@ -5099,10 +5095,12 @@
                   <a:rPr lang="ru-RU" dirty="0" smtClean="0"/>
                   <a:t>Проблемы</a:t>
                 </a:r>
-                <a:endParaRPr lang="ru-RU" dirty="0" smtClean="0"/>
               </a:p>
               <a:p>
                 <a:pPr lvl="1">
+                  <a:buClr>
+                    <a:srgbClr val="FF0000"/>
+                  </a:buClr>
                   <a:buFont typeface="Wingdings 2" pitchFamily="18" charset="2"/>
                   <a:buChar char=""/>
                 </a:pPr>
@@ -5114,6 +5112,9 @@
               </a:p>
               <a:p>
                 <a:pPr lvl="1">
+                  <a:buClr>
+                    <a:srgbClr val="FF0000"/>
+                  </a:buClr>
                   <a:buFont typeface="Wingdings 2" pitchFamily="18" charset="2"/>
                   <a:buChar char=""/>
                 </a:pPr>
@@ -5125,6 +5126,9 @@
               </a:p>
               <a:p>
                 <a:pPr lvl="1">
+                  <a:buClr>
+                    <a:srgbClr val="FF0000"/>
+                  </a:buClr>
                   <a:buFont typeface="Wingdings 2" pitchFamily="18" charset="2"/>
                   <a:buChar char=""/>
                 </a:pPr>
@@ -5192,17 +5196,12 @@
           <a:p>
             <a:r>
               <a:rPr lang="ru-RU" dirty="0" smtClean="0"/>
-              <a:t>Контентные </a:t>
-            </a:r>
-            <a:r>
-              <a:rPr lang="ru-RU" dirty="0" smtClean="0"/>
-              <a:t>метод</a:t>
+              <a:t>Контентные метод</a:t>
             </a:r>
             <a:r>
               <a:rPr lang="ru-RU" dirty="0"/>
               <a:t>ы</a:t>
             </a:r>
-            <a:endParaRPr lang="ru-RU" dirty="0"/>
           </a:p>
         </p:txBody>
       </p:sp>
@@ -5531,10 +5530,12 @@
                   <a:rPr lang="ru-RU" dirty="0" smtClean="0"/>
                   <a:t>Проблемы</a:t>
                 </a:r>
-                <a:endParaRPr lang="ru-RU" dirty="0" smtClean="0"/>
               </a:p>
               <a:p>
                 <a:pPr lvl="1">
+                  <a:buClr>
+                    <a:srgbClr val="FF0000"/>
+                  </a:buClr>
                   <a:buFont typeface="Wingdings 2" pitchFamily="18" charset="2"/>
                   <a:buChar char=""/>
                 </a:pPr>
@@ -5546,6 +5547,9 @@
               </a:p>
               <a:p>
                 <a:pPr lvl="1">
+                  <a:buClr>
+                    <a:srgbClr val="FF0000"/>
+                  </a:buClr>
                   <a:buFont typeface="Wingdings 2" pitchFamily="18" charset="2"/>
                   <a:buChar char=""/>
                 </a:pPr>
@@ -5557,6 +5561,9 @@
               </a:p>
               <a:p>
                 <a:pPr lvl="1">
+                  <a:buClr>
+                    <a:srgbClr val="FF0000"/>
+                  </a:buClr>
                   <a:buFont typeface="Wingdings 2" pitchFamily="18" charset="2"/>
                   <a:buChar char=""/>
                 </a:pPr>
@@ -5567,6 +5574,9 @@
               </a:p>
               <a:p>
                 <a:pPr lvl="1">
+                  <a:buClr>
+                    <a:srgbClr val="FF0000"/>
+                  </a:buClr>
                   <a:buFont typeface="Wingdings 2" pitchFamily="18" charset="2"/>
                   <a:buChar char=""/>
                 </a:pPr>
@@ -5633,11 +5643,7 @@
           <a:p>
             <a:r>
               <a:rPr lang="ru-RU" dirty="0" smtClean="0"/>
-              <a:t>Методы с</a:t>
-            </a:r>
-            <a:r>
-              <a:rPr lang="ru-RU" dirty="0" smtClean="0"/>
-              <a:t>овместной фильтрации</a:t>
+              <a:t>Методы совместной фильтрации</a:t>
             </a:r>
             <a:endParaRPr lang="ru-RU" dirty="0"/>
           </a:p>
@@ -5909,11 +5915,7 @@
           <a:p>
             <a:r>
               <a:rPr lang="ru-RU" dirty="0" smtClean="0"/>
-              <a:t>Метод с</a:t>
-            </a:r>
-            <a:r>
-              <a:rPr lang="ru-RU" dirty="0" smtClean="0"/>
-              <a:t>крытых факторов</a:t>
+              <a:t>Метод скрытых факторов</a:t>
             </a:r>
             <a:endParaRPr lang="ru-RU" dirty="0"/>
           </a:p>
@@ -6514,7 +6516,6 @@
               <a:rPr lang="ru-RU" dirty="0"/>
               <a:t>Гордость и Предубеждение</a:t>
             </a:r>
-            <a:endParaRPr lang="ru-RU" dirty="0"/>
           </a:p>
         </p:txBody>
       </p:sp>
@@ -6584,7 +6585,6 @@
               <a:rPr lang="ru-RU" dirty="0"/>
               <a:t>Криминальное Чтиво</a:t>
             </a:r>
-            <a:endParaRPr lang="ru-RU" dirty="0"/>
           </a:p>
         </p:txBody>
       </p:sp>
@@ -6614,7 +6614,6 @@
               <a:rPr lang="ru-RU" dirty="0"/>
               <a:t>День Независимости</a:t>
             </a:r>
-            <a:endParaRPr lang="ru-RU" dirty="0"/>
           </a:p>
         </p:txBody>
       </p:sp>
@@ -6850,12 +6849,11 @@
               <a:rPr lang="ru-RU" dirty="0"/>
               <a:t>Метод скрытых факторов</a:t>
             </a:r>
-            <a:endParaRPr lang="ru-RU" dirty="0"/>
-          </a:p>
-        </p:txBody>
-      </p:sp>
-      <mc:AlternateContent xmlns:mc="http://schemas.openxmlformats.org/markup-compatibility/2006">
-        <mc:Choice xmlns:a14="http://schemas.microsoft.com/office/drawing/2010/main" Requires="a14">
+          </a:p>
+        </p:txBody>
+      </p:sp>
+      <mc:AlternateContent xmlns:mc="http://schemas.openxmlformats.org/markup-compatibility/2006" xmlns:a14="http://schemas.microsoft.com/office/drawing/2010/main">
+        <mc:Choice Requires="a14">
           <p:sp>
             <p:nvSpPr>
               <p:cNvPr id="3" name="Объект 2"/>
@@ -6891,15 +6889,7 @@
                 <a:pPr lvl="1"/>
                 <a:r>
                   <a:rPr lang="ru-RU" dirty="0" smtClean="0"/>
-                  <a:t>о</a:t>
-                </a:r>
-                <a:r>
-                  <a:rPr lang="ru-RU" dirty="0" smtClean="0"/>
-                  <a:t>бъекта </a:t>
-                </a:r>
-                <a:r>
-                  <a:rPr lang="ru-RU" dirty="0" smtClean="0"/>
-                  <a:t>— </a:t>
+                  <a:t>объекта — </a:t>
                 </a:r>
                 <a14:m>
                   <m:oMath xmlns:m="http://schemas.openxmlformats.org/officeDocument/2006/math">
@@ -6975,15 +6965,7 @@
                 <a:pPr lvl="1"/>
                 <a:r>
                   <a:rPr lang="ru-RU" dirty="0" smtClean="0"/>
-                  <a:t>п</a:t>
-                </a:r>
-                <a:r>
-                  <a:rPr lang="ru-RU" dirty="0" smtClean="0"/>
-                  <a:t>ользователя </a:t>
-                </a:r>
-                <a:r>
-                  <a:rPr lang="ru-RU" dirty="0" smtClean="0"/>
-                  <a:t>— </a:t>
+                  <a:t>пользователя — </a:t>
                 </a:r>
                 <a14:m>
                   <m:oMath xmlns:m="http://schemas.openxmlformats.org/officeDocument/2006/math">
@@ -7058,11 +7040,7 @@
               <a:p>
                 <a:r>
                   <a:rPr lang="ru-RU" dirty="0" smtClean="0"/>
-                  <a:t>Предполагаемая </a:t>
-                </a:r>
-                <a:r>
-                  <a:rPr lang="ru-RU" dirty="0" smtClean="0"/>
-                  <a:t>оценка </a:t>
+                  <a:t>Предполагаемая оценка </a:t>
                 </a:r>
                 <a:endParaRPr lang="en-US" dirty="0" smtClean="0"/>
               </a:p>
@@ -7191,13 +7169,8 @@
               <a:p>
                 <a:r>
                   <a:rPr lang="ru-RU" dirty="0" smtClean="0"/>
-                  <a:t>Сингулярное разложение матрицы оценок позволяет получить </a:t>
+                  <a:t>Сингулярное разложение матрицы оценок позволяет получить значения факторов для пользователей и объектов</a:t>
                 </a:r>
-                <a:r>
-                  <a:rPr lang="ru-RU" dirty="0" smtClean="0"/>
-                  <a:t>значения факторов для пользователей и объектов</a:t>
-                </a:r>
-                <a:endParaRPr lang="ru-RU" dirty="0" smtClean="0"/>
               </a:p>
               <a:p>
                 <a:pPr marL="0" indent="0">
@@ -7208,7 +7181,7 @@
             </p:txBody>
           </p:sp>
         </mc:Choice>
-        <mc:Fallback>
+        <mc:Fallback xmlns="">
           <p:sp>
             <p:nvSpPr>
               <p:cNvPr id="3" name="Объект 2"/>
@@ -7312,56 +7285,111 @@
             <p:ph type="title"/>
           </p:nvPr>
         </p:nvSpPr>
+        <p:spPr>
+          <a:xfrm>
+            <a:off x="457200" y="274638"/>
+            <a:ext cx="8229600" cy="1138138"/>
+          </a:xfrm>
+        </p:spPr>
+        <p:txBody>
+          <a:bodyPr>
+            <a:noAutofit/>
+          </a:bodyPr>
+          <a:lstStyle/>
+          <a:p>
+            <a:r>
+              <a:rPr lang="ru-RU" sz="3900" dirty="0" smtClean="0"/>
+              <a:t>Проблемы метода </a:t>
+            </a:r>
+            <a:r>
+              <a:rPr lang="ru-RU" sz="3900" dirty="0" smtClean="0"/>
+              <a:t>скрытых факторов</a:t>
+            </a:r>
+            <a:endParaRPr lang="ru-RU" sz="3900" dirty="0"/>
+          </a:p>
+        </p:txBody>
+      </p:sp>
+      <p:sp>
+        <p:nvSpPr>
+          <p:cNvPr id="3" name="Объект 2"/>
+          <p:cNvSpPr>
+            <a:spLocks noGrp="1"/>
+          </p:cNvSpPr>
+          <p:nvPr>
+            <p:ph idx="1"/>
+          </p:nvPr>
+        </p:nvSpPr>
         <p:spPr/>
         <p:txBody>
-          <a:bodyPr/>
-          <a:lstStyle/>
-          <a:p>
+          <a:bodyPr>
+            <a:normAutofit/>
+          </a:bodyPr>
+          <a:lstStyle/>
+          <a:p>
+            <a:pPr>
+              <a:buClr>
+                <a:srgbClr val="FF0000"/>
+              </a:buClr>
+              <a:buFont typeface="Wingdings 2" pitchFamily="18" charset="2"/>
+              <a:buChar char=""/>
+            </a:pPr>
+            <a:r>
+              <a:rPr lang="ru-RU" dirty="0"/>
+              <a:t>Сингулярное разложение матрицы ресурсоемко</a:t>
+            </a:r>
+          </a:p>
+          <a:p>
+            <a:pPr>
+              <a:buClr>
+                <a:srgbClr val="FF0000"/>
+              </a:buClr>
+              <a:buFont typeface="Wingdings 2" pitchFamily="18" charset="2"/>
+              <a:buChar char=""/>
+            </a:pPr>
+            <a:r>
+              <a:rPr lang="ru-RU" dirty="0"/>
+              <a:t>Необходимость экспериментального </a:t>
+            </a:r>
             <a:r>
               <a:rPr lang="ru-RU" dirty="0" smtClean="0"/>
-              <a:t>Метод скрытых факторов</a:t>
+              <a:t>подбора настроечных параметров</a:t>
             </a:r>
             <a:endParaRPr lang="ru-RU" dirty="0"/>
           </a:p>
-        </p:txBody>
-      </p:sp>
-      <p:sp>
-        <p:nvSpPr>
-          <p:cNvPr id="3" name="Объект 2"/>
-          <p:cNvSpPr>
-            <a:spLocks noGrp="1"/>
-          </p:cNvSpPr>
-          <p:nvPr>
-            <p:ph idx="1"/>
-          </p:nvPr>
-        </p:nvSpPr>
-        <p:spPr/>
-        <p:txBody>
-          <a:bodyPr/>
-          <a:lstStyle/>
-          <a:p>
+          <a:p>
+            <a:pPr>
+              <a:buClr>
+                <a:srgbClr val="FF0000"/>
+              </a:buClr>
+              <a:buFont typeface="Wingdings 2" pitchFamily="18" charset="2"/>
+              <a:buChar char=""/>
+            </a:pPr>
+            <a:r>
+              <a:rPr lang="ru-RU" dirty="0"/>
+              <a:t>Необходимость регулярного пересчета</a:t>
+            </a:r>
+          </a:p>
+          <a:p>
+            <a:pPr>
+              <a:buClr>
+                <a:srgbClr val="FF0000"/>
+              </a:buClr>
+              <a:buFont typeface="Wingdings 2" pitchFamily="18" charset="2"/>
+              <a:buChar char=""/>
+            </a:pPr>
             <a:r>
               <a:rPr lang="ru-RU" dirty="0" smtClean="0"/>
-              <a:t>Сингулярное разложение матрицы ресурсоемко</a:t>
-            </a:r>
-          </a:p>
-          <a:p>
+              <a:t>Невозможность </a:t>
+            </a:r>
+            <a:r>
+              <a:rPr lang="ru-RU" dirty="0"/>
+              <a:t>явного обоснования </a:t>
+            </a:r>
             <a:r>
               <a:rPr lang="ru-RU" dirty="0" smtClean="0"/>
-              <a:t>Необходимость экспериментального подбора настроечных параметров</a:t>
-            </a:r>
-          </a:p>
-          <a:p>
-            <a:r>
-              <a:rPr lang="ru-RU" dirty="0" smtClean="0"/>
-              <a:t>Необходимость регулярного пересчета</a:t>
-            </a:r>
-          </a:p>
-          <a:p>
-            <a:r>
-              <a:rPr lang="ru-RU" dirty="0" smtClean="0"/>
-              <a:t>Невозможность явного обоснования рекомендаций</a:t>
-            </a:r>
+              <a:t>рекомендаций</a:t>
+            </a:r>
+            <a:endParaRPr lang="ru-RU" dirty="0" smtClean="0"/>
           </a:p>
           <a:p>
             <a:endParaRPr lang="ru-RU" dirty="0"/>
@@ -7479,11 +7507,7 @@
             </a:r>
             <a:r>
               <a:rPr lang="ru-RU" dirty="0" smtClean="0"/>
-              <a:t> Явные </a:t>
-            </a:r>
-            <a:r>
-              <a:rPr lang="ru-RU" dirty="0" smtClean="0"/>
-              <a:t>факторы </a:t>
+              <a:t> Явные факторы </a:t>
             </a:r>
             <a:r>
               <a:rPr lang="ru-RU" dirty="0" smtClean="0">
@@ -7502,7 +7526,6 @@
               <a:rPr lang="ru-RU" dirty="0" smtClean="0"/>
               <a:t>Разнородные объекты сравнимы</a:t>
             </a:r>
-            <a:endParaRPr lang="ru-RU" dirty="0" smtClean="0"/>
           </a:p>
           <a:p>
             <a:r>
@@ -7607,8 +7630,8 @@
         </p:nvSpPr>
         <p:spPr>
           <a:xfrm>
-            <a:off x="3537944" y="5589240"/>
-            <a:ext cx="1250080" cy="429670"/>
+            <a:off x="3239852" y="5589240"/>
+            <a:ext cx="1620180" cy="429670"/>
           </a:xfrm>
           <a:prstGeom prst="rect">
             <a:avLst/>
@@ -7646,10 +7669,10 @@
               </a:spcAft>
             </a:pPr>
             <a:r>
-              <a:rPr lang="ru-RU" sz="1600" b="0" u="sng" kern="1200" dirty="0" smtClean="0"/>
+              <a:rPr lang="ru-RU" sz="2400" b="0" u="sng" kern="1200" dirty="0" smtClean="0"/>
               <a:t>Фантастика</a:t>
             </a:r>
-            <a:endParaRPr lang="ru-RU" sz="1600" b="0" u="sng" kern="1200" dirty="0"/>
+            <a:endParaRPr lang="ru-RU" sz="2400" b="0" u="sng" kern="1200" dirty="0"/>
           </a:p>
         </p:txBody>
       </p:sp>
@@ -7662,7 +7685,7 @@
         <p:spPr>
           <a:xfrm>
             <a:off x="6516216" y="5589240"/>
-            <a:ext cx="1440160" cy="429670"/>
+            <a:ext cx="1728192" cy="429670"/>
           </a:xfrm>
           <a:prstGeom prst="rect">
             <a:avLst/>
@@ -7700,10 +7723,10 @@
               </a:spcAft>
             </a:pPr>
             <a:r>
-              <a:rPr lang="ru-RU" sz="1600" b="0" u="sng" kern="1200" dirty="0" smtClean="0"/>
+              <a:rPr lang="ru-RU" sz="2400" b="0" u="sng" kern="1200" dirty="0" smtClean="0"/>
               <a:t>Антиутопия</a:t>
             </a:r>
-            <a:endParaRPr lang="ru-RU" sz="1600" b="0" u="sng" kern="1200" dirty="0"/>
+            <a:endParaRPr lang="ru-RU" sz="2400" b="0" u="sng" kern="1200" dirty="0"/>
           </a:p>
         </p:txBody>
       </p:sp>
@@ -7715,8 +7738,8 @@
         </p:nvSpPr>
         <p:spPr>
           <a:xfrm>
-            <a:off x="1331640" y="5607126"/>
-            <a:ext cx="1512168" cy="429670"/>
+            <a:off x="899592" y="5607126"/>
+            <a:ext cx="1944216" cy="429670"/>
           </a:xfrm>
           <a:prstGeom prst="rect">
             <a:avLst/>
@@ -7754,14 +7777,13 @@
               </a:spcAft>
             </a:pPr>
             <a:r>
-              <a:rPr lang="ru-RU" sz="1600" b="0" u="sng" kern="1200" dirty="0" err="1" smtClean="0"/>
+              <a:rPr lang="ru-RU" sz="2400" b="0" u="sng" kern="1200" dirty="0" err="1" smtClean="0"/>
               <a:t>Олдос</a:t>
             </a:r>
             <a:r>
-              <a:rPr lang="ru-RU" sz="1600" b="0" u="sng" kern="1200" dirty="0" smtClean="0"/>
+              <a:rPr lang="ru-RU" sz="2400" b="0" u="sng" kern="1200" dirty="0" smtClean="0"/>
               <a:t> Хаксли</a:t>
             </a:r>
-            <a:endParaRPr lang="ru-RU" sz="1600" b="0" u="sng" kern="1200" dirty="0" smtClean="0"/>
           </a:p>
         </p:txBody>
       </p:sp>
@@ -7812,18 +7834,10 @@
               </a:spcAft>
             </a:pPr>
             <a:r>
-              <a:rPr lang="ru-RU" sz="1600" b="0" u="sng" kern="1200" dirty="0" smtClean="0"/>
-              <a:t>Дивный </a:t>
-            </a:r>
-            <a:r>
-              <a:rPr lang="ru-RU" sz="1600" b="0" u="sng" kern="1200" dirty="0" smtClean="0"/>
-              <a:t>новый </a:t>
-            </a:r>
-            <a:r>
-              <a:rPr lang="ru-RU" sz="1600" b="0" u="sng" kern="1200" dirty="0" smtClean="0"/>
-              <a:t>мир</a:t>
-            </a:r>
-            <a:endParaRPr lang="ru-RU" sz="1600" b="0" u="sng" kern="1200" dirty="0"/>
+              <a:rPr lang="ru-RU" sz="2400" b="0" u="sng" kern="1200" dirty="0" smtClean="0"/>
+              <a:t>Дивный новый мир</a:t>
+            </a:r>
+            <a:endParaRPr lang="ru-RU" sz="2400" b="0" u="sng" kern="1200" dirty="0"/>
           </a:p>
         </p:txBody>
       </p:sp>
@@ -7874,10 +7888,10 @@
               </a:spcAft>
             </a:pPr>
             <a:r>
-              <a:rPr lang="ru-RU" sz="1600" u="sng" kern="1200" dirty="0" smtClean="0"/>
+              <a:rPr lang="ru-RU" sz="2400" u="sng" kern="1200" dirty="0" smtClean="0"/>
               <a:t>Книга</a:t>
             </a:r>
-            <a:endParaRPr lang="ru-RU" sz="1600" b="0" u="sng" kern="1200" dirty="0"/>
+            <a:endParaRPr lang="ru-RU" sz="2400" b="0" u="sng" kern="1200" dirty="0"/>
           </a:p>
         </p:txBody>
       </p:sp>
@@ -7924,8 +7938,8 @@
         </p:nvCxnSpPr>
         <p:spPr>
           <a:xfrm flipH="1">
-            <a:off x="4162984" y="4653136"/>
-            <a:ext cx="383364" cy="936104"/>
+            <a:off x="4049942" y="4653136"/>
+            <a:ext cx="496406" cy="936104"/>
           </a:xfrm>
           <a:prstGeom prst="straightConnector1">
             <a:avLst/>
@@ -8099,7 +8113,7 @@
           <a:p>
             <a:r>
               <a:rPr lang="ru-RU" sz="1400" dirty="0" smtClean="0"/>
-              <a:t>23</a:t>
+              <a:t>13</a:t>
             </a:r>
             <a:endParaRPr lang="ru-RU" sz="1400" dirty="0"/>
           </a:p>
@@ -8114,7 +8128,7 @@
         <p:spPr>
           <a:xfrm>
             <a:off x="6442942" y="5035988"/>
-            <a:ext cx="367408" cy="307777"/>
+            <a:ext cx="276038" cy="307777"/>
           </a:xfrm>
           <a:prstGeom prst="rect">
             <a:avLst/>
@@ -8129,7 +8143,7 @@
           <a:p>
             <a:r>
               <a:rPr lang="ru-RU" sz="1400" dirty="0" smtClean="0"/>
-              <a:t>23</a:t>
+              <a:t>7</a:t>
             </a:r>
             <a:endParaRPr lang="ru-RU" sz="1400" dirty="0"/>
           </a:p>

</xml_diff>

<commit_message>
papers added, slides updated
</commit_message>
<xml_diff>
--- a/slides.pptx
+++ b/slides.pptx
@@ -20,8 +20,8 @@
     <p:sldId id="274" r:id="rId11"/>
     <p:sldId id="277" r:id="rId12"/>
     <p:sldId id="296" r:id="rId13"/>
-    <p:sldId id="295" r:id="rId14"/>
-    <p:sldId id="297" r:id="rId15"/>
+    <p:sldId id="299" r:id="rId14"/>
+    <p:sldId id="300" r:id="rId15"/>
     <p:sldId id="278" r:id="rId16"/>
     <p:sldId id="275" r:id="rId17"/>
   </p:sldIdLst>
@@ -139,8 +139,8 @@
             <p14:sldId id="274"/>
             <p14:sldId id="277"/>
             <p14:sldId id="296"/>
-            <p14:sldId id="295"/>
-            <p14:sldId id="297"/>
+            <p14:sldId id="299"/>
+            <p14:sldId id="300"/>
             <p14:sldId id="278"/>
             <p14:sldId id="275"/>
           </p14:sldIdLst>
@@ -234,7 +234,7 @@
                 </c:pt>
                 <c:pt idx="2">
                   <c:v>Netflix
-Cinematch</c:v>
+Winner</c:v>
                 </c:pt>
               </c:strCache>
             </c:strRef>
@@ -252,7 +252,7 @@
                   <c:v>1.25</c:v>
                 </c:pt>
                 <c:pt idx="2">
-                  <c:v>0.95</c:v>
+                  <c:v>0.85</c:v>
                 </c:pt>
               </c:numCache>
             </c:numRef>
@@ -299,7 +299,7 @@
                 </c:pt>
                 <c:pt idx="2">
                   <c:v>Netflix
-Cinematch</c:v>
+Winner</c:v>
                 </c:pt>
               </c:strCache>
             </c:strRef>
@@ -317,7 +317,7 @@
                   <c:v>3.75</c:v>
                 </c:pt>
                 <c:pt idx="2">
-                  <c:v>4.05</c:v>
+                  <c:v>4.1500000000000004</c:v>
                 </c:pt>
               </c:numCache>
             </c:numRef>
@@ -333,11 +333,11 @@
         </c:dLbls>
         <c:gapWidth val="150"/>
         <c:overlap val="100"/>
-        <c:axId val="51414912"/>
-        <c:axId val="6802816"/>
+        <c:axId val="36760576"/>
+        <c:axId val="37138816"/>
       </c:barChart>
       <c:catAx>
-        <c:axId val="51414912"/>
+        <c:axId val="36760576"/>
         <c:scaling>
           <c:orientation val="minMax"/>
         </c:scaling>
@@ -346,7 +346,7 @@
         <c:majorTickMark val="out"/>
         <c:minorTickMark val="none"/>
         <c:tickLblPos val="nextTo"/>
-        <c:crossAx val="6802816"/>
+        <c:crossAx val="37138816"/>
         <c:crosses val="autoZero"/>
         <c:auto val="1"/>
         <c:lblAlgn val="ctr"/>
@@ -354,7 +354,7 @@
         <c:noMultiLvlLbl val="0"/>
       </c:catAx>
       <c:valAx>
-        <c:axId val="6802816"/>
+        <c:axId val="37138816"/>
         <c:scaling>
           <c:orientation val="minMax"/>
           <c:max val="5"/>
@@ -366,7 +366,7 @@
         <c:majorTickMark val="out"/>
         <c:minorTickMark val="none"/>
         <c:tickLblPos val="nextTo"/>
-        <c:crossAx val="51414912"/>
+        <c:crossAx val="36760576"/>
         <c:crosses val="autoZero"/>
         <c:crossBetween val="between"/>
         <c:minorUnit val="1"/>
@@ -474,7 +474,7 @@
           <a:p>
             <a:fld id="{67C91A86-5441-47F6-8D3E-5E4E18ABE360}" type="datetimeFigureOut">
               <a:rPr lang="ru-RU" smtClean="0"/>
-              <a:t>06.06.2011</a:t>
+              <a:t>07.06.2011</a:t>
             </a:fld>
             <a:endParaRPr lang="ru-RU"/>
           </a:p>
@@ -1058,67 +1058,11 @@
           <a:bodyPr/>
           <a:lstStyle/>
           <a:p>
-            <a:pPr marL="0" marR="0" indent="0" algn="l" defTabSz="914400" rtl="0" eaLnBrk="1" fontAlgn="auto" latinLnBrk="0" hangingPunct="1">
-              <a:lnSpc>
-                <a:spcPct val="100000"/>
-              </a:lnSpc>
-              <a:spcBef>
-                <a:spcPts val="0"/>
-              </a:spcBef>
-              <a:spcAft>
-                <a:spcPts val="0"/>
-              </a:spcAft>
-              <a:buClrTx/>
-              <a:buSzTx/>
-              <a:buFontTx/>
-              <a:buNone/>
-              <a:tabLst/>
-              <a:defRPr/>
-            </a:pPr>
             <a:r>
               <a:rPr lang="ru-RU" dirty="0" smtClean="0"/>
-              <a:t>— описать </a:t>
+              <a:t>— подумать над тем, что такое качество описания (метода или имплементации?)</a:t>
             </a:r>
-            <a:r>
-              <a:rPr lang="ru-RU" baseline="0" dirty="0" smtClean="0"/>
-              <a:t>сценарий, какие проблемы он </a:t>
-            </a:r>
-            <a:r>
-              <a:rPr lang="ru-RU" baseline="0" dirty="0" smtClean="0"/>
-              <a:t>решает =</a:t>
-            </a:r>
-            <a:r>
-              <a:rPr lang="en-US" baseline="0" dirty="0" smtClean="0"/>
-              <a:t>&gt;</a:t>
-            </a:r>
-            <a:r>
-              <a:rPr lang="ru-RU" baseline="0" dirty="0" smtClean="0"/>
-              <a:t> устно</a:t>
-            </a:r>
-            <a:endParaRPr lang="ru-RU" dirty="0" smtClean="0"/>
-          </a:p>
-          <a:p>
-            <a:r>
-              <a:rPr lang="ru-RU" dirty="0" smtClean="0"/>
-              <a:t>— комментарии к разметке,</a:t>
-            </a:r>
-            <a:r>
-              <a:rPr lang="ru-RU" baseline="0" dirty="0" smtClean="0"/>
-              <a:t> что где и </a:t>
-            </a:r>
-            <a:r>
-              <a:rPr lang="ru-RU" baseline="0" dirty="0" smtClean="0"/>
-              <a:t>зачем =</a:t>
-            </a:r>
-            <a:r>
-              <a:rPr lang="en-US" baseline="0" dirty="0" smtClean="0"/>
-              <a:t>&gt; </a:t>
-            </a:r>
-            <a:r>
-              <a:rPr lang="ru-RU" baseline="0" dirty="0" smtClean="0"/>
-              <a:t>иконки</a:t>
-            </a:r>
-            <a:endParaRPr lang="ru-RU" baseline="0" dirty="0" smtClean="0"/>
+            <a:endParaRPr lang="ru-RU" dirty="0"/>
           </a:p>
         </p:txBody>
       </p:sp>
@@ -1139,223 +1083,6 @@
           <a:p>
             <a:fld id="{F5CBF342-61E1-4C99-A998-7256C07FB8EE}" type="slidenum">
               <a:rPr lang="ru-RU" smtClean="0"/>
-              <a:t>13</a:t>
-            </a:fld>
-            <a:endParaRPr lang="ru-RU"/>
-          </a:p>
-        </p:txBody>
-      </p:sp>
-    </p:spTree>
-    <p:extLst>
-      <p:ext uri="{BB962C8B-B14F-4D97-AF65-F5344CB8AC3E}">
-        <p14:creationId xmlns:p14="http://schemas.microsoft.com/office/powerpoint/2010/main" val="3202303882"/>
-      </p:ext>
-    </p:extLst>
-  </p:cSld>
-  <p:clrMapOvr>
-    <a:masterClrMapping/>
-  </p:clrMapOvr>
-</p:notes>
-</file>
-
-<file path=ppt/notesSlides/notesSlide5.xml><?xml version="1.0" encoding="utf-8"?>
-<p:notes xmlns:a="http://schemas.openxmlformats.org/drawingml/2006/main" xmlns:r="http://schemas.openxmlformats.org/officeDocument/2006/relationships" xmlns:p="http://schemas.openxmlformats.org/presentationml/2006/main">
-  <p:cSld>
-    <p:spTree>
-      <p:nvGrpSpPr>
-        <p:cNvPr id="1" name=""/>
-        <p:cNvGrpSpPr/>
-        <p:nvPr/>
-      </p:nvGrpSpPr>
-      <p:grpSpPr>
-        <a:xfrm>
-          <a:off x="0" y="0"/>
-          <a:ext cx="0" cy="0"/>
-          <a:chOff x="0" y="0"/>
-          <a:chExt cx="0" cy="0"/>
-        </a:xfrm>
-      </p:grpSpPr>
-      <p:sp>
-        <p:nvSpPr>
-          <p:cNvPr id="2" name="Образ слайда 1"/>
-          <p:cNvSpPr>
-            <a:spLocks noGrp="1" noRot="1" noChangeAspect="1"/>
-          </p:cNvSpPr>
-          <p:nvPr>
-            <p:ph type="sldImg"/>
-          </p:nvPr>
-        </p:nvSpPr>
-        <p:spPr/>
-      </p:sp>
-      <p:sp>
-        <p:nvSpPr>
-          <p:cNvPr id="3" name="Заметки 2"/>
-          <p:cNvSpPr>
-            <a:spLocks noGrp="1"/>
-          </p:cNvSpPr>
-          <p:nvPr>
-            <p:ph type="body" idx="1"/>
-          </p:nvPr>
-        </p:nvSpPr>
-        <p:spPr/>
-        <p:txBody>
-          <a:bodyPr/>
-          <a:lstStyle/>
-          <a:p>
-            <a:pPr marL="0" marR="0" indent="0" algn="l" defTabSz="914400" rtl="0" eaLnBrk="1" fontAlgn="auto" latinLnBrk="0" hangingPunct="1">
-              <a:lnSpc>
-                <a:spcPct val="100000"/>
-              </a:lnSpc>
-              <a:spcBef>
-                <a:spcPts val="0"/>
-              </a:spcBef>
-              <a:spcAft>
-                <a:spcPts val="0"/>
-              </a:spcAft>
-              <a:buClrTx/>
-              <a:buSzTx/>
-              <a:buFontTx/>
-              <a:buNone/>
-              <a:tabLst/>
-              <a:defRPr/>
-            </a:pPr>
-            <a:r>
-              <a:rPr lang="ru-RU" dirty="0" smtClean="0"/>
-              <a:t>— описать </a:t>
-            </a:r>
-            <a:r>
-              <a:rPr lang="ru-RU" baseline="0" dirty="0" smtClean="0"/>
-              <a:t>сценарий, какие проблемы он решает</a:t>
-            </a:r>
-            <a:endParaRPr lang="ru-RU" dirty="0" smtClean="0"/>
-          </a:p>
-          <a:p>
-            <a:r>
-              <a:rPr lang="ru-RU" dirty="0" smtClean="0"/>
-              <a:t>— комментарии к разметке,</a:t>
-            </a:r>
-            <a:r>
-              <a:rPr lang="ru-RU" baseline="0" dirty="0" smtClean="0"/>
-              <a:t> что где и зачем</a:t>
-            </a:r>
-          </a:p>
-          <a:p>
-            <a:endParaRPr lang="ru-RU" baseline="0" dirty="0" smtClean="0"/>
-          </a:p>
-          <a:p>
-            <a:r>
-              <a:rPr lang="ru-RU" baseline="0" dirty="0" smtClean="0"/>
-              <a:t>— добавить еще скриншоты к другим проблемам/сценариям</a:t>
-            </a:r>
-            <a:endParaRPr lang="ru-RU" dirty="0"/>
-          </a:p>
-        </p:txBody>
-      </p:sp>
-      <p:sp>
-        <p:nvSpPr>
-          <p:cNvPr id="4" name="Номер слайда 3"/>
-          <p:cNvSpPr>
-            <a:spLocks noGrp="1"/>
-          </p:cNvSpPr>
-          <p:nvPr>
-            <p:ph type="sldNum" sz="quarter" idx="10"/>
-          </p:nvPr>
-        </p:nvSpPr>
-        <p:spPr/>
-        <p:txBody>
-          <a:bodyPr/>
-          <a:lstStyle/>
-          <a:p>
-            <a:fld id="{F5CBF342-61E1-4C99-A998-7256C07FB8EE}" type="slidenum">
-              <a:rPr lang="ru-RU" smtClean="0"/>
-              <a:t>14</a:t>
-            </a:fld>
-            <a:endParaRPr lang="ru-RU"/>
-          </a:p>
-        </p:txBody>
-      </p:sp>
-    </p:spTree>
-    <p:extLst>
-      <p:ext uri="{BB962C8B-B14F-4D97-AF65-F5344CB8AC3E}">
-        <p14:creationId xmlns:p14="http://schemas.microsoft.com/office/powerpoint/2010/main" val="3202303882"/>
-      </p:ext>
-    </p:extLst>
-  </p:cSld>
-  <p:clrMapOvr>
-    <a:masterClrMapping/>
-  </p:clrMapOvr>
-</p:notes>
-</file>
-
-<file path=ppt/notesSlides/notesSlide6.xml><?xml version="1.0" encoding="utf-8"?>
-<p:notes xmlns:a="http://schemas.openxmlformats.org/drawingml/2006/main" xmlns:r="http://schemas.openxmlformats.org/officeDocument/2006/relationships" xmlns:p="http://schemas.openxmlformats.org/presentationml/2006/main">
-  <p:cSld>
-    <p:spTree>
-      <p:nvGrpSpPr>
-        <p:cNvPr id="1" name=""/>
-        <p:cNvGrpSpPr/>
-        <p:nvPr/>
-      </p:nvGrpSpPr>
-      <p:grpSpPr>
-        <a:xfrm>
-          <a:off x="0" y="0"/>
-          <a:ext cx="0" cy="0"/>
-          <a:chOff x="0" y="0"/>
-          <a:chExt cx="0" cy="0"/>
-        </a:xfrm>
-      </p:grpSpPr>
-      <p:sp>
-        <p:nvSpPr>
-          <p:cNvPr id="2" name="Образ слайда 1"/>
-          <p:cNvSpPr>
-            <a:spLocks noGrp="1" noRot="1" noChangeAspect="1"/>
-          </p:cNvSpPr>
-          <p:nvPr>
-            <p:ph type="sldImg"/>
-          </p:nvPr>
-        </p:nvSpPr>
-        <p:spPr/>
-      </p:sp>
-      <p:sp>
-        <p:nvSpPr>
-          <p:cNvPr id="3" name="Заметки 2"/>
-          <p:cNvSpPr>
-            <a:spLocks noGrp="1"/>
-          </p:cNvSpPr>
-          <p:nvPr>
-            <p:ph type="body" idx="1"/>
-          </p:nvPr>
-        </p:nvSpPr>
-        <p:spPr/>
-        <p:txBody>
-          <a:bodyPr/>
-          <a:lstStyle/>
-          <a:p>
-            <a:r>
-              <a:rPr lang="ru-RU" dirty="0" smtClean="0"/>
-              <a:t>— подумать над тем, что такое качество описания (метода или имплементации?)</a:t>
-            </a:r>
-            <a:endParaRPr lang="ru-RU" dirty="0"/>
-          </a:p>
-        </p:txBody>
-      </p:sp>
-      <p:sp>
-        <p:nvSpPr>
-          <p:cNvPr id="4" name="Номер слайда 3"/>
-          <p:cNvSpPr>
-            <a:spLocks noGrp="1"/>
-          </p:cNvSpPr>
-          <p:nvPr>
-            <p:ph type="sldNum" sz="quarter" idx="10"/>
-          </p:nvPr>
-        </p:nvSpPr>
-        <p:spPr/>
-        <p:txBody>
-          <a:bodyPr/>
-          <a:lstStyle/>
-          <a:p>
-            <a:fld id="{F5CBF342-61E1-4C99-A998-7256C07FB8EE}" type="slidenum">
-              <a:rPr lang="ru-RU" smtClean="0"/>
               <a:t>15</a:t>
             </a:fld>
             <a:endParaRPr lang="ru-RU"/>
@@ -1375,7 +1102,7 @@
 </p:notes>
 </file>
 
-<file path=ppt/notesSlides/notesSlide7.xml><?xml version="1.0" encoding="utf-8"?>
+<file path=ppt/notesSlides/notesSlide5.xml><?xml version="1.0" encoding="utf-8"?>
 <p:notes xmlns:a="http://schemas.openxmlformats.org/drawingml/2006/main" xmlns:r="http://schemas.openxmlformats.org/officeDocument/2006/relationships" xmlns:p="http://schemas.openxmlformats.org/presentationml/2006/main">
   <p:cSld>
     <p:spTree>
@@ -1640,7 +1367,7 @@
           <a:p>
             <a:fld id="{213ECCEC-8E04-4CF6-8633-56B5E0A77197}" type="datetime1">
               <a:rPr lang="ru-RU" smtClean="0"/>
-              <a:t>06.06.2011</a:t>
+              <a:t>07.06.2011</a:t>
             </a:fld>
             <a:endParaRPr lang="ru-RU"/>
           </a:p>
@@ -1810,7 +1537,7 @@
           <a:p>
             <a:fld id="{2E6603A8-E35D-4200-8015-B24D615941D4}" type="datetime1">
               <a:rPr lang="ru-RU" smtClean="0"/>
-              <a:t>06.06.2011</a:t>
+              <a:t>07.06.2011</a:t>
             </a:fld>
             <a:endParaRPr lang="ru-RU"/>
           </a:p>
@@ -1990,7 +1717,7 @@
           <a:p>
             <a:fld id="{B1004C43-31A3-4172-9A99-2EC012F9BEA3}" type="datetime1">
               <a:rPr lang="ru-RU" smtClean="0"/>
-              <a:t>06.06.2011</a:t>
+              <a:t>07.06.2011</a:t>
             </a:fld>
             <a:endParaRPr lang="ru-RU"/>
           </a:p>
@@ -2160,7 +1887,7 @@
           <a:p>
             <a:fld id="{54303ED9-D49E-4859-9055-A17C4B6BBBF2}" type="datetime1">
               <a:rPr lang="ru-RU" smtClean="0"/>
-              <a:t>06.06.2011</a:t>
+              <a:t>07.06.2011</a:t>
             </a:fld>
             <a:endParaRPr lang="ru-RU"/>
           </a:p>
@@ -2406,7 +2133,7 @@
           <a:p>
             <a:fld id="{22D0B91C-7E08-4301-B201-427BB408C90C}" type="datetime1">
               <a:rPr lang="ru-RU" smtClean="0"/>
-              <a:t>06.06.2011</a:t>
+              <a:t>07.06.2011</a:t>
             </a:fld>
             <a:endParaRPr lang="ru-RU"/>
           </a:p>
@@ -2694,7 +2421,7 @@
           <a:p>
             <a:fld id="{FAC5777C-00D6-4151-99C2-1109AF848B66}" type="datetime1">
               <a:rPr lang="ru-RU" smtClean="0"/>
-              <a:t>06.06.2011</a:t>
+              <a:t>07.06.2011</a:t>
             </a:fld>
             <a:endParaRPr lang="ru-RU"/>
           </a:p>
@@ -3116,7 +2843,7 @@
           <a:p>
             <a:fld id="{D0450615-B923-461F-B86A-44BECAFF3A68}" type="datetime1">
               <a:rPr lang="ru-RU" smtClean="0"/>
-              <a:t>06.06.2011</a:t>
+              <a:t>07.06.2011</a:t>
             </a:fld>
             <a:endParaRPr lang="ru-RU"/>
           </a:p>
@@ -3234,7 +2961,7 @@
           <a:p>
             <a:fld id="{1C7CEDB4-570B-4941-AB30-185299BFD713}" type="datetime1">
               <a:rPr lang="ru-RU" smtClean="0"/>
-              <a:t>06.06.2011</a:t>
+              <a:t>07.06.2011</a:t>
             </a:fld>
             <a:endParaRPr lang="ru-RU"/>
           </a:p>
@@ -3329,7 +3056,7 @@
           <a:p>
             <a:fld id="{B5106DB6-3B78-4694-8647-46252A9B37D0}" type="datetime1">
               <a:rPr lang="ru-RU" smtClean="0"/>
-              <a:t>06.06.2011</a:t>
+              <a:t>07.06.2011</a:t>
             </a:fld>
             <a:endParaRPr lang="ru-RU"/>
           </a:p>
@@ -3606,7 +3333,7 @@
           <a:p>
             <a:fld id="{A02C3694-482A-4D54-A276-5C72D1324954}" type="datetime1">
               <a:rPr lang="ru-RU" smtClean="0"/>
-              <a:t>06.06.2011</a:t>
+              <a:t>07.06.2011</a:t>
             </a:fld>
             <a:endParaRPr lang="ru-RU"/>
           </a:p>
@@ -3859,7 +3586,7 @@
           <a:p>
             <a:fld id="{2C52DEBC-865F-4005-AD89-C7D580DA13ED}" type="datetime1">
               <a:rPr lang="ru-RU" smtClean="0"/>
-              <a:t>06.06.2011</a:t>
+              <a:t>07.06.2011</a:t>
             </a:fld>
             <a:endParaRPr lang="ru-RU"/>
           </a:p>
@@ -4072,7 +3799,7 @@
           <a:p>
             <a:fld id="{97CDA6B0-9F2F-4E6B-806E-559C2E8A8581}" type="datetime1">
               <a:rPr lang="ru-RU" smtClean="0"/>
-              <a:t>06.06.2011</a:t>
+              <a:t>07.06.2011</a:t>
             </a:fld>
             <a:endParaRPr lang="ru-RU"/>
           </a:p>
@@ -4738,8 +4465,8 @@
           </a:p>
         </p:txBody>
       </p:sp>
-      <mc:AlternateContent xmlns:mc="http://schemas.openxmlformats.org/markup-compatibility/2006">
-        <mc:Choice xmlns:a14="http://schemas.microsoft.com/office/drawing/2010/main" Requires="a14">
+      <mc:AlternateContent xmlns:mc="http://schemas.openxmlformats.org/markup-compatibility/2006" xmlns:a14="http://schemas.microsoft.com/office/drawing/2010/main">
+        <mc:Choice Requires="a14">
           <p:sp>
             <p:nvSpPr>
               <p:cNvPr id="5" name="Объект 4"/>
@@ -4987,11 +4714,7 @@
                 </a:br>
                 <a:r>
                   <a:rPr lang="ru-RU" dirty="0" smtClean="0"/>
-                  <a:t>Вес </a:t>
-                </a:r>
-                <a:r>
-                  <a:rPr lang="ru-RU" dirty="0" smtClean="0"/>
-                  <a:t>связи </a:t>
+                  <a:t>Вес связи </a:t>
                 </a:r>
                 <a14:m>
                   <m:oMath xmlns:m="http://schemas.openxmlformats.org/officeDocument/2006/math">
@@ -5733,7 +5456,7 @@
             </p:txBody>
           </p:sp>
         </mc:Choice>
-        <mc:Fallback>
+        <mc:Fallback xmlns="">
           <p:sp>
             <p:nvSpPr>
               <p:cNvPr id="5" name="Объект 4"/>
@@ -6203,8 +5926,8 @@
           </p:spPr>
         </p:pic>
       </p:grpSp>
-      <mc:AlternateContent xmlns:mc="http://schemas.openxmlformats.org/markup-compatibility/2006">
-        <mc:Choice xmlns:a14="http://schemas.microsoft.com/office/drawing/2010/main" Requires="a14">
+      <mc:AlternateContent xmlns:mc="http://schemas.openxmlformats.org/markup-compatibility/2006" xmlns:a14="http://schemas.microsoft.com/office/drawing/2010/main">
+        <mc:Choice Requires="a14">
           <p:sp>
             <p:nvSpPr>
               <p:cNvPr id="10" name="Прямоугольник 9"/>
@@ -6226,6 +5949,7 @@
               </a:bodyPr>
               <a:lstStyle/>
               <a:p>
+                <a:pPr/>
                 <a14:m>
                   <m:oMathPara xmlns:m="http://schemas.openxmlformats.org/officeDocument/2006/math">
                     <m:oMathParaPr>
@@ -6249,7 +5973,7 @@
             </p:txBody>
           </p:sp>
         </mc:Choice>
-        <mc:Fallback>
+        <mc:Fallback xmlns="">
           <p:sp>
             <p:nvSpPr>
               <p:cNvPr id="10" name="Прямоугольник 9"/>
@@ -6288,8 +6012,8 @@
           </p:sp>
         </mc:Fallback>
       </mc:AlternateContent>
-      <mc:AlternateContent xmlns:mc="http://schemas.openxmlformats.org/markup-compatibility/2006">
-        <mc:Choice xmlns:a14="http://schemas.microsoft.com/office/drawing/2010/main" Requires="a14">
+      <mc:AlternateContent xmlns:mc="http://schemas.openxmlformats.org/markup-compatibility/2006" xmlns:a14="http://schemas.microsoft.com/office/drawing/2010/main">
+        <mc:Choice Requires="a14">
           <p:sp>
             <p:nvSpPr>
               <p:cNvPr id="32" name="Прямоугольник 31"/>
@@ -6311,6 +6035,7 @@
               </a:bodyPr>
               <a:lstStyle/>
               <a:p>
+                <a:pPr/>
                 <a14:m>
                   <m:oMathPara xmlns:m="http://schemas.openxmlformats.org/officeDocument/2006/math">
                     <m:oMathParaPr>
@@ -6331,7 +6056,7 @@
             </p:txBody>
           </p:sp>
         </mc:Choice>
-        <mc:Fallback>
+        <mc:Fallback xmlns="">
           <p:sp>
             <p:nvSpPr>
               <p:cNvPr id="32" name="Прямоугольник 31"/>
@@ -6834,13 +6559,6 @@
               </a:rPr>
               <a:t>2</a:t>
             </a:r>
-            <a:endParaRPr lang="ru-RU" dirty="0">
-              <a:solidFill>
-                <a:schemeClr val="bg1">
-                  <a:lumMod val="85000"/>
-                </a:schemeClr>
-              </a:solidFill>
-            </a:endParaRPr>
           </a:p>
         </p:txBody>
       </p:sp>
@@ -6876,13 +6594,6 @@
               </a:rPr>
               <a:t>2</a:t>
             </a:r>
-            <a:endParaRPr lang="ru-RU" dirty="0">
-              <a:solidFill>
-                <a:schemeClr val="bg1">
-                  <a:lumMod val="85000"/>
-                </a:schemeClr>
-              </a:solidFill>
-            </a:endParaRPr>
           </a:p>
         </p:txBody>
       </p:sp>
@@ -7282,7 +6993,7 @@
             <p:ph idx="1"/>
             <p:extLst>
               <p:ext uri="{D42A27DB-BD31-4B8C-83A1-F6EECF244321}">
-                <p14:modId xmlns:p14="http://schemas.microsoft.com/office/powerpoint/2010/main" val="4145166361"/>
+                <p14:modId xmlns:p14="http://schemas.microsoft.com/office/powerpoint/2010/main" val="2513509546"/>
               </p:ext>
             </p:extLst>
           </p:nvPr>
@@ -7409,11 +7120,7 @@
             </a:pPr>
             <a:r>
               <a:rPr lang="ru-RU" dirty="0" smtClean="0"/>
-              <a:t>3 900 </a:t>
-            </a:r>
-            <a:r>
-              <a:rPr lang="ru-RU" dirty="0" smtClean="0"/>
-              <a:t>фильмов</a:t>
+              <a:t>3 900 фильмов</a:t>
             </a:r>
             <a:endParaRPr lang="en-US" dirty="0"/>
           </a:p>
@@ -8012,15 +7719,7 @@
               <a:avLst/>
             </a:prstGeom>
             <a:grpFill/>
-            <a:extLst>
-              <a:ext uri="{909E8E84-426E-40DD-AFC4-6F175D3DCCD1}">
-                <a14:hiddenFill xmlns:a14="http://schemas.microsoft.com/office/drawing/2010/main">
-                  <a:solidFill>
-                    <a:srgbClr val="FFFFFF"/>
-                  </a:solidFill>
-                </a14:hiddenFill>
-              </a:ext>
-            </a:extLst>
+            <a:extLst/>
           </p:spPr>
         </p:pic>
       </p:grpSp>
@@ -8105,15 +7804,7 @@
               <a:avLst/>
             </a:prstGeom>
             <a:grpFill/>
-            <a:extLst>
-              <a:ext uri="{909E8E84-426E-40DD-AFC4-6F175D3DCCD1}">
-                <a14:hiddenFill xmlns:a14="http://schemas.microsoft.com/office/drawing/2010/main">
-                  <a:solidFill>
-                    <a:srgbClr val="FFFFFF"/>
-                  </a:solidFill>
-                </a14:hiddenFill>
-              </a:ext>
-            </a:extLst>
+            <a:extLst/>
           </p:spPr>
         </p:pic>
       </p:grpSp>
@@ -8194,15 +7885,7 @@
               <a:avLst/>
             </a:prstGeom>
             <a:grpFill/>
-            <a:extLst>
-              <a:ext uri="{909E8E84-426E-40DD-AFC4-6F175D3DCCD1}">
-                <a14:hiddenFill xmlns:a14="http://schemas.microsoft.com/office/drawing/2010/main">
-                  <a:solidFill>
-                    <a:srgbClr val="FFFFFF"/>
-                  </a:solidFill>
-                </a14:hiddenFill>
-              </a:ext>
-            </a:extLst>
+            <a:extLst/>
           </p:spPr>
         </p:pic>
       </p:grpSp>
@@ -8291,15 +7974,7 @@
               <a:avLst/>
             </a:prstGeom>
             <a:grpFill/>
-            <a:extLst>
-              <a:ext uri="{909E8E84-426E-40DD-AFC4-6F175D3DCCD1}">
-                <a14:hiddenFill xmlns:a14="http://schemas.microsoft.com/office/drawing/2010/main">
-                  <a:solidFill>
-                    <a:srgbClr val="FFFFFF"/>
-                  </a:solidFill>
-                </a14:hiddenFill>
-              </a:ext>
-            </a:extLst>
+            <a:extLst/>
           </p:spPr>
         </p:pic>
       </p:grpSp>
@@ -8388,15 +8063,7 @@
               <a:avLst/>
             </a:prstGeom>
             <a:grpFill/>
-            <a:extLst>
-              <a:ext uri="{909E8E84-426E-40DD-AFC4-6F175D3DCCD1}">
-                <a14:hiddenFill xmlns:a14="http://schemas.microsoft.com/office/drawing/2010/main">
-                  <a:solidFill>
-                    <a:srgbClr val="FFFFFF"/>
-                  </a:solidFill>
-                </a14:hiddenFill>
-              </a:ext>
-            </a:extLst>
+            <a:extLst/>
           </p:spPr>
         </p:pic>
       </p:grpSp>
@@ -8423,8 +8090,8 @@
             <a:solidFill>
               <a:schemeClr val="tx1"/>
             </a:solidFill>
-            <a:headEnd type="none" w="med" len="med"/>
-            <a:tailEnd type="triangle" w="med" len="med"/>
+            <a:headEnd type="triangle" w="med" len="med"/>
+            <a:tailEnd type="none" w="med" len="med"/>
           </a:ln>
         </p:spPr>
         <p:style>
@@ -8465,8 +8132,8 @@
             <a:solidFill>
               <a:schemeClr val="tx1"/>
             </a:solidFill>
-            <a:headEnd type="none" w="med" len="med"/>
-            <a:tailEnd type="triangle" w="med" len="med"/>
+            <a:headEnd type="triangle" w="med" len="med"/>
+            <a:tailEnd type="none" w="med" len="med"/>
           </a:ln>
         </p:spPr>
         <p:style>
@@ -8568,15 +8235,7 @@
               <a:avLst/>
             </a:prstGeom>
             <a:grpFill/>
-            <a:extLst>
-              <a:ext uri="{909E8E84-426E-40DD-AFC4-6F175D3DCCD1}">
-                <a14:hiddenFill xmlns:a14="http://schemas.microsoft.com/office/drawing/2010/main">
-                  <a:solidFill>
-                    <a:srgbClr val="FFFFFF"/>
-                  </a:solidFill>
-                </a14:hiddenFill>
-              </a:ext>
-            </a:extLst>
+            <a:extLst/>
           </p:spPr>
         </p:pic>
       </p:grpSp>
@@ -8825,15 +8484,7 @@
               <a:avLst/>
             </a:prstGeom>
             <a:grpFill/>
-            <a:extLst>
-              <a:ext uri="{909E8E84-426E-40DD-AFC4-6F175D3DCCD1}">
-                <a14:hiddenFill xmlns:a14="http://schemas.microsoft.com/office/drawing/2010/main">
-                  <a:solidFill>
-                    <a:srgbClr val="FFFFFF"/>
-                  </a:solidFill>
-                </a14:hiddenFill>
-              </a:ext>
-            </a:extLst>
+            <a:extLst/>
           </p:spPr>
         </p:pic>
       </p:grpSp>
@@ -8842,13 +8493,14 @@
           <p:cNvPr id="70" name="Прямая со стрелкой 69"/>
           <p:cNvCxnSpPr>
             <a:stCxn id="37" idx="2"/>
+            <a:endCxn id="68" idx="0"/>
           </p:cNvCxnSpPr>
           <p:nvPr/>
         </p:nvCxnSpPr>
         <p:spPr>
           <a:xfrm>
             <a:off x="4129744" y="4038225"/>
-            <a:ext cx="21158" cy="1479007"/>
+            <a:ext cx="21158" cy="1546804"/>
           </a:xfrm>
           <a:prstGeom prst="straightConnector1">
             <a:avLst/>
@@ -8858,7 +8510,7 @@
               <a:schemeClr val="tx1"/>
             </a:solidFill>
             <a:headEnd type="none" w="med" len="med"/>
-            <a:tailEnd type="diamond" w="lg" len="lg"/>
+            <a:tailEnd type="triangle" w="med" len="med"/>
           </a:ln>
         </p:spPr>
         <p:style>
@@ -8961,15 +8613,7 @@
               <a:avLst/>
             </a:prstGeom>
             <a:grpFill/>
-            <a:extLst>
-              <a:ext uri="{909E8E84-426E-40DD-AFC4-6F175D3DCCD1}">
-                <a14:hiddenFill xmlns:a14="http://schemas.microsoft.com/office/drawing/2010/main">
-                  <a:solidFill>
-                    <a:srgbClr val="FFFFFF"/>
-                  </a:solidFill>
-                </a14:hiddenFill>
-              </a:ext>
-            </a:extLst>
+            <a:extLst/>
           </p:spPr>
         </p:pic>
       </p:grpSp>
@@ -9049,39 +8693,9 @@
           <a:chExt cx="0" cy="0"/>
         </a:xfrm>
       </p:grpSpPr>
-      <p:pic>
-        <p:nvPicPr>
-          <p:cNvPr id="3" name="Рисунок 2"/>
-          <p:cNvPicPr>
-            <a:picLocks noChangeAspect="1"/>
-          </p:cNvPicPr>
-          <p:nvPr/>
-        </p:nvPicPr>
-        <p:blipFill>
-          <a:blip r:embed="rId3">
-            <a:extLst>
-              <a:ext uri="{28A0092B-C50C-407E-A947-70E740481C1C}">
-                <a14:useLocalDpi xmlns:a14="http://schemas.microsoft.com/office/drawing/2010/main" val="0"/>
-              </a:ext>
-            </a:extLst>
-          </a:blip>
-          <a:stretch>
-            <a:fillRect/>
-          </a:stretch>
-        </p:blipFill>
-        <p:spPr>
-          <a:xfrm>
-            <a:off x="548426" y="1434909"/>
-            <a:ext cx="7794377" cy="4062263"/>
-          </a:xfrm>
-          <a:prstGeom prst="rect">
-            <a:avLst/>
-          </a:prstGeom>
-        </p:spPr>
-      </p:pic>
       <p:sp>
         <p:nvSpPr>
-          <p:cNvPr id="2" name="Заголовок 1"/>
+          <p:cNvPr id="5" name="Заголовок 4"/>
           <p:cNvSpPr>
             <a:spLocks noGrp="1"/>
           </p:cNvSpPr>
@@ -9097,10 +8711,9 @@
           <a:lstStyle/>
           <a:p>
             <a:r>
-              <a:rPr lang="ru-RU" sz="3600" dirty="0" smtClean="0"/>
+              <a:rPr lang="ru-RU" dirty="0"/>
               <a:t>Прототип рекомендательной системы по методу вложенных тегов</a:t>
             </a:r>
-            <a:endParaRPr lang="ru-RU" sz="3600" dirty="0"/>
           </a:p>
         </p:txBody>
       </p:sp>
@@ -9127,9 +8740,46 @@
           </a:p>
         </p:txBody>
       </p:sp>
+      <p:pic>
+        <p:nvPicPr>
+          <p:cNvPr id="39" name="Рисунок 38"/>
+          <p:cNvPicPr>
+            <a:picLocks noChangeAspect="1"/>
+          </p:cNvPicPr>
+          <p:nvPr/>
+        </p:nvPicPr>
+        <p:blipFill>
+          <a:blip r:embed="rId2">
+            <a:extLst>
+              <a:ext uri="{28A0092B-C50C-407E-A947-70E740481C1C}">
+                <a14:useLocalDpi xmlns:a14="http://schemas.microsoft.com/office/drawing/2010/main" val="0"/>
+              </a:ext>
+            </a:extLst>
+          </a:blip>
+          <a:stretch>
+            <a:fillRect/>
+          </a:stretch>
+        </p:blipFill>
+        <p:spPr>
+          <a:xfrm>
+            <a:off x="548426" y="1434909"/>
+            <a:ext cx="7794377" cy="4062263"/>
+          </a:xfrm>
+          <a:prstGeom prst="rect">
+            <a:avLst/>
+          </a:prstGeom>
+          <a:effectLst>
+            <a:outerShdw blurRad="254000" dist="50800" dir="5400000" sx="103000" sy="103000" algn="ctr" rotWithShape="0">
+              <a:schemeClr val="tx1">
+                <a:alpha val="15000"/>
+              </a:schemeClr>
+            </a:outerShdw>
+          </a:effectLst>
+        </p:spPr>
+      </p:pic>
       <p:cxnSp>
         <p:nvCxnSpPr>
-          <p:cNvPr id="38" name="Прямая со стрелкой 37"/>
+          <p:cNvPr id="40" name="Прямая со стрелкой 39"/>
           <p:cNvCxnSpPr/>
           <p:nvPr/>
         </p:nvCxnSpPr>
@@ -9217,7 +8867,7 @@
       </p:cxnSp>
       <p:cxnSp>
         <p:nvCxnSpPr>
-          <p:cNvPr id="7176" name="Соединительная линия уступом 7175"/>
+          <p:cNvPr id="42" name="Соединительная линия уступом 41"/>
           <p:cNvCxnSpPr/>
           <p:nvPr/>
         </p:nvCxnSpPr>
@@ -9263,7 +8913,7 @@
       </p:cxnSp>
       <p:cxnSp>
         <p:nvCxnSpPr>
-          <p:cNvPr id="60" name="Прямая со стрелкой 59"/>
+          <p:cNvPr id="43" name="Прямая со стрелкой 42"/>
           <p:cNvCxnSpPr/>
           <p:nvPr/>
         </p:nvCxnSpPr>
@@ -9307,7 +8957,7 @@
       </p:cxnSp>
       <p:cxnSp>
         <p:nvCxnSpPr>
-          <p:cNvPr id="85" name="Соединительная линия уступом 84"/>
+          <p:cNvPr id="44" name="Соединительная линия уступом 43"/>
           <p:cNvCxnSpPr/>
           <p:nvPr/>
         </p:nvCxnSpPr>
@@ -9353,7 +9003,7 @@
       </p:cxnSp>
       <p:cxnSp>
         <p:nvCxnSpPr>
-          <p:cNvPr id="91" name="Прямая со стрелкой 90"/>
+          <p:cNvPr id="45" name="Прямая со стрелкой 44"/>
           <p:cNvCxnSpPr/>
           <p:nvPr/>
         </p:nvCxnSpPr>
@@ -9397,7 +9047,7 @@
       </p:cxnSp>
       <p:grpSp>
         <p:nvGrpSpPr>
-          <p:cNvPr id="11" name="Группа 10"/>
+          <p:cNvPr id="46" name="Группа 45"/>
           <p:cNvGrpSpPr/>
           <p:nvPr/>
         </p:nvGrpSpPr>
@@ -9411,7 +9061,7 @@
         </p:grpSpPr>
         <p:sp>
           <p:nvSpPr>
-            <p:cNvPr id="12" name="Овал 11"/>
+            <p:cNvPr id="48" name="Овал 47"/>
             <p:cNvSpPr/>
             <p:nvPr/>
           </p:nvSpPr>
@@ -9457,14 +9107,14 @@
         </p:sp>
         <p:pic>
           <p:nvPicPr>
-            <p:cNvPr id="13" name="Picture 5" descr="D:\Personal\Projects\Thesis\slides_icons\box_white.png"/>
+            <p:cNvPr id="49" name="Picture 5" descr="D:\Personal\Projects\Thesis\slides_icons\box_white.png"/>
             <p:cNvPicPr>
               <a:picLocks noChangeAspect="1" noChangeArrowheads="1"/>
             </p:cNvPicPr>
             <p:nvPr/>
           </p:nvPicPr>
           <p:blipFill>
-            <a:blip r:embed="rId4">
+            <a:blip r:embed="rId3">
               <a:extLst>
                 <a:ext uri="{28A0092B-C50C-407E-A947-70E740481C1C}">
                   <a14:useLocalDpi xmlns:a14="http://schemas.microsoft.com/office/drawing/2010/main" val="0"/>
@@ -9499,14 +9149,14 @@
       </p:grpSp>
       <p:pic>
         <p:nvPicPr>
-          <p:cNvPr id="14" name="Picture 7" descr="D:\Personal\Projects\Thesis\slides_icons\tag.png"/>
+          <p:cNvPr id="50" name="Picture 7" descr="D:\Personal\Projects\Thesis\slides_icons\tag.png"/>
           <p:cNvPicPr>
             <a:picLocks noChangeAspect="1" noChangeArrowheads="1"/>
           </p:cNvPicPr>
           <p:nvPr/>
         </p:nvPicPr>
         <p:blipFill>
-          <a:blip r:embed="rId5">
+          <a:blip r:embed="rId4">
             <a:extLst>
               <a:ext uri="{28A0092B-C50C-407E-A947-70E740481C1C}">
                 <a14:useLocalDpi xmlns:a14="http://schemas.microsoft.com/office/drawing/2010/main" val="0"/>
@@ -9540,7 +9190,7 @@
       </p:pic>
       <p:grpSp>
         <p:nvGrpSpPr>
-          <p:cNvPr id="18" name="Группа 17"/>
+          <p:cNvPr id="51" name="Группа 50"/>
           <p:cNvGrpSpPr/>
           <p:nvPr/>
         </p:nvGrpSpPr>
@@ -9554,7 +9204,7 @@
         </p:grpSpPr>
         <p:sp>
           <p:nvSpPr>
-            <p:cNvPr id="19" name="Овал 18"/>
+            <p:cNvPr id="52" name="Овал 51"/>
             <p:cNvSpPr/>
             <p:nvPr/>
           </p:nvSpPr>
@@ -9602,14 +9252,14 @@
         </p:sp>
         <p:pic>
           <p:nvPicPr>
-            <p:cNvPr id="20" name="Picture 2" descr="D:\Personal\Projects\Thesis\slides_icons\user.png"/>
+            <p:cNvPr id="53" name="Picture 2" descr="D:\Personal\Projects\Thesis\slides_icons\user.png"/>
             <p:cNvPicPr>
               <a:picLocks noChangeAspect="1" noChangeArrowheads="1"/>
             </p:cNvPicPr>
             <p:nvPr/>
           </p:nvPicPr>
           <p:blipFill>
-            <a:blip r:embed="rId6">
+            <a:blip r:embed="rId5">
               <a:extLst>
                 <a:ext uri="{28A0092B-C50C-407E-A947-70E740481C1C}">
                   <a14:useLocalDpi xmlns:a14="http://schemas.microsoft.com/office/drawing/2010/main" val="0"/>
@@ -9644,14 +9294,14 @@
       </p:grpSp>
       <p:pic>
         <p:nvPicPr>
-          <p:cNvPr id="21" name="Picture 7" descr="D:\Personal\Projects\Thesis\slides_icons\tag.png"/>
+          <p:cNvPr id="54" name="Picture 7" descr="D:\Personal\Projects\Thesis\slides_icons\tag.png"/>
           <p:cNvPicPr>
             <a:picLocks noChangeAspect="1" noChangeArrowheads="1"/>
           </p:cNvPicPr>
           <p:nvPr/>
         </p:nvPicPr>
         <p:blipFill>
-          <a:blip r:embed="rId5">
+          <a:blip r:embed="rId4">
             <a:extLst>
               <a:ext uri="{28A0092B-C50C-407E-A947-70E740481C1C}">
                 <a14:useLocalDpi xmlns:a14="http://schemas.microsoft.com/office/drawing/2010/main" val="0"/>
@@ -9685,7 +9335,7 @@
       </p:pic>
       <p:grpSp>
         <p:nvGrpSpPr>
-          <p:cNvPr id="30" name="Группа 29"/>
+          <p:cNvPr id="55" name="Группа 54"/>
           <p:cNvGrpSpPr/>
           <p:nvPr/>
         </p:nvGrpSpPr>
@@ -9699,7 +9349,7 @@
         </p:grpSpPr>
         <p:sp>
           <p:nvSpPr>
-            <p:cNvPr id="31" name="Овал 30"/>
+            <p:cNvPr id="56" name="Овал 55"/>
             <p:cNvSpPr/>
             <p:nvPr/>
           </p:nvSpPr>
@@ -9746,14 +9396,14 @@
         </p:sp>
         <p:pic>
           <p:nvPicPr>
-            <p:cNvPr id="32" name="Picture 5" descr="D:\Personal\Projects\Thesis\slides_icons\user_white.png"/>
+            <p:cNvPr id="57" name="Picture 5" descr="D:\Personal\Projects\Thesis\slides_icons\user_white.png"/>
             <p:cNvPicPr>
               <a:picLocks noChangeAspect="1" noChangeArrowheads="1"/>
             </p:cNvPicPr>
             <p:nvPr/>
           </p:nvPicPr>
           <p:blipFill>
-            <a:blip r:embed="rId7">
+            <a:blip r:embed="rId6">
               <a:extLst>
                 <a:ext uri="{28A0092B-C50C-407E-A947-70E740481C1C}">
                   <a14:useLocalDpi xmlns:a14="http://schemas.microsoft.com/office/drawing/2010/main" val="0"/>
@@ -9788,7 +9438,7 @@
       </p:grpSp>
       <p:grpSp>
         <p:nvGrpSpPr>
-          <p:cNvPr id="66" name="Группа 65"/>
+          <p:cNvPr id="58" name="Группа 57"/>
           <p:cNvGrpSpPr/>
           <p:nvPr/>
         </p:nvGrpSpPr>
@@ -9802,7 +9452,7 @@
         </p:grpSpPr>
         <p:sp>
           <p:nvSpPr>
-            <p:cNvPr id="67" name="Овал 66"/>
+            <p:cNvPr id="60" name="Овал 59"/>
             <p:cNvSpPr/>
             <p:nvPr/>
           </p:nvSpPr>
@@ -9850,14 +9500,14 @@
         </p:sp>
         <p:pic>
           <p:nvPicPr>
-            <p:cNvPr id="68" name="Picture 4" descr="D:\Personal\Projects\Thesis\slides_icons\box.png"/>
+            <p:cNvPr id="61" name="Picture 4" descr="D:\Personal\Projects\Thesis\slides_icons\box.png"/>
             <p:cNvPicPr>
               <a:picLocks noChangeAspect="1" noChangeArrowheads="1"/>
             </p:cNvPicPr>
             <p:nvPr/>
           </p:nvPicPr>
           <p:blipFill>
-            <a:blip r:embed="rId8">
+            <a:blip r:embed="rId7">
               <a:extLst>
                 <a:ext uri="{28A0092B-C50C-407E-A947-70E740481C1C}">
                   <a14:useLocalDpi xmlns:a14="http://schemas.microsoft.com/office/drawing/2010/main" val="0"/>
@@ -9892,7 +9542,7 @@
       </p:grpSp>
       <p:cxnSp>
         <p:nvCxnSpPr>
-          <p:cNvPr id="69" name="Прямая соединительная линия 68"/>
+          <p:cNvPr id="62" name="Прямая соединительная линия 61"/>
           <p:cNvCxnSpPr/>
           <p:nvPr/>
         </p:nvCxnSpPr>
@@ -9911,6 +9561,98 @@
               </a:schemeClr>
             </a:solidFill>
           </a:ln>
+        </p:spPr>
+        <p:style>
+          <a:lnRef idx="1">
+            <a:schemeClr val="accent1"/>
+          </a:lnRef>
+          <a:fillRef idx="0">
+            <a:schemeClr val="accent1"/>
+          </a:fillRef>
+          <a:effectRef idx="0">
+            <a:schemeClr val="accent1"/>
+          </a:effectRef>
+          <a:fontRef idx="minor">
+            <a:schemeClr val="tx1"/>
+          </a:fontRef>
+        </p:style>
+      </p:cxnSp>
+      <p:pic>
+        <p:nvPicPr>
+          <p:cNvPr id="63" name="Picture 7" descr="D:\Personal\Projects\Thesis\slides_icons\tag.png"/>
+          <p:cNvPicPr>
+            <a:picLocks noChangeAspect="1" noChangeArrowheads="1"/>
+          </p:cNvPicPr>
+          <p:nvPr/>
+        </p:nvPicPr>
+        <p:blipFill>
+          <a:blip r:embed="rId4">
+            <a:duotone>
+              <a:schemeClr val="accent3">
+                <a:shade val="45000"/>
+                <a:satMod val="135000"/>
+              </a:schemeClr>
+              <a:prstClr val="white"/>
+            </a:duotone>
+            <a:extLst>
+              <a:ext uri="{28A0092B-C50C-407E-A947-70E740481C1C}">
+                <a14:useLocalDpi xmlns:a14="http://schemas.microsoft.com/office/drawing/2010/main" val="0"/>
+              </a:ext>
+            </a:extLst>
+          </a:blip>
+          <a:srcRect/>
+          <a:stretch>
+            <a:fillRect/>
+          </a:stretch>
+        </p:blipFill>
+        <p:spPr bwMode="auto">
+          <a:xfrm rot="2700000">
+            <a:off x="5595983" y="5770590"/>
+            <a:ext cx="424309" cy="424309"/>
+          </a:xfrm>
+          <a:prstGeom prst="rect">
+            <a:avLst/>
+          </a:prstGeom>
+          <a:noFill/>
+          <a:extLst>
+            <a:ext uri="{909E8E84-426E-40DD-AFC4-6F175D3DCCD1}">
+              <a14:hiddenFill xmlns:a14="http://schemas.microsoft.com/office/drawing/2010/main">
+                <a:solidFill>
+                  <a:srgbClr val="FFFFFF"/>
+                </a:solidFill>
+              </a14:hiddenFill>
+            </a:ext>
+          </a:extLst>
+        </p:spPr>
+      </p:pic>
+      <p:cxnSp>
+        <p:nvCxnSpPr>
+          <p:cNvPr id="64" name="Прямая со стрелкой 63"/>
+          <p:cNvCxnSpPr/>
+          <p:nvPr/>
+        </p:nvCxnSpPr>
+        <p:spPr>
+          <a:xfrm flipV="1">
+            <a:off x="5808137" y="4005064"/>
+            <a:ext cx="0" cy="1597135"/>
+          </a:xfrm>
+          <a:prstGeom prst="straightConnector1">
+            <a:avLst/>
+          </a:prstGeom>
+          <a:ln w="28575">
+            <a:solidFill>
+              <a:srgbClr val="0000FF"/>
+            </a:solidFill>
+            <a:headEnd type="none" w="med" len="med"/>
+            <a:tailEnd type="triangle" w="med" len="med"/>
+          </a:ln>
+          <a:effectLst>
+            <a:glow rad="152400">
+              <a:schemeClr val="bg1">
+                <a:alpha val="87000"/>
+              </a:schemeClr>
+            </a:glow>
+          </a:effectLst>
         </p:spPr>
         <p:style>
           <a:lnRef idx="1">
@@ -9930,7 +9672,7 @@
     </p:spTree>
     <p:extLst>
       <p:ext uri="{BB962C8B-B14F-4D97-AF65-F5344CB8AC3E}">
-        <p14:creationId xmlns:p14="http://schemas.microsoft.com/office/powerpoint/2010/main" val="3769257879"/>
+        <p14:creationId xmlns:p14="http://schemas.microsoft.com/office/powerpoint/2010/main" val="1742751013"/>
       </p:ext>
     </p:extLst>
   </p:cSld>
@@ -9964,39 +9706,9 @@
           <a:chExt cx="0" cy="0"/>
         </a:xfrm>
       </p:grpSpPr>
-      <p:pic>
-        <p:nvPicPr>
-          <p:cNvPr id="6" name="Рисунок 5"/>
-          <p:cNvPicPr>
-            <a:picLocks noChangeAspect="1"/>
-          </p:cNvPicPr>
-          <p:nvPr/>
-        </p:nvPicPr>
-        <p:blipFill>
-          <a:blip r:embed="rId3">
-            <a:extLst>
-              <a:ext uri="{28A0092B-C50C-407E-A947-70E740481C1C}">
-                <a14:useLocalDpi xmlns:a14="http://schemas.microsoft.com/office/drawing/2010/main" val="0"/>
-              </a:ext>
-            </a:extLst>
-          </a:blip>
-          <a:stretch>
-            <a:fillRect/>
-          </a:stretch>
-        </p:blipFill>
-        <p:spPr>
-          <a:xfrm>
-            <a:off x="934808" y="2741047"/>
-            <a:ext cx="7694802" cy="3581042"/>
-          </a:xfrm>
-          <a:prstGeom prst="rect">
-            <a:avLst/>
-          </a:prstGeom>
-        </p:spPr>
-      </p:pic>
       <p:sp>
         <p:nvSpPr>
-          <p:cNvPr id="2" name="Заголовок 1"/>
+          <p:cNvPr id="5" name="Заголовок 4"/>
           <p:cNvSpPr>
             <a:spLocks noGrp="1"/>
           </p:cNvSpPr>
@@ -10012,10 +9724,9 @@
           <a:lstStyle/>
           <a:p>
             <a:r>
-              <a:rPr lang="ru-RU" sz="3600" dirty="0" smtClean="0"/>
+              <a:rPr lang="ru-RU" dirty="0"/>
               <a:t>Прототип рекомендательной системы по методу вложенных тегов</a:t>
             </a:r>
-            <a:endParaRPr lang="ru-RU" sz="3600" dirty="0"/>
           </a:p>
         </p:txBody>
       </p:sp>
@@ -10042,9 +9753,46 @@
           </a:p>
         </p:txBody>
       </p:sp>
+      <p:pic>
+        <p:nvPicPr>
+          <p:cNvPr id="65" name="Рисунок 64"/>
+          <p:cNvPicPr>
+            <a:picLocks noChangeAspect="1"/>
+          </p:cNvPicPr>
+          <p:nvPr/>
+        </p:nvPicPr>
+        <p:blipFill>
+          <a:blip r:embed="rId2">
+            <a:extLst>
+              <a:ext uri="{28A0092B-C50C-407E-A947-70E740481C1C}">
+                <a14:useLocalDpi xmlns:a14="http://schemas.microsoft.com/office/drawing/2010/main" val="0"/>
+              </a:ext>
+            </a:extLst>
+          </a:blip>
+          <a:stretch>
+            <a:fillRect/>
+          </a:stretch>
+        </p:blipFill>
+        <p:spPr>
+          <a:xfrm>
+            <a:off x="934808" y="2741047"/>
+            <a:ext cx="7694802" cy="3581042"/>
+          </a:xfrm>
+          <a:prstGeom prst="rect">
+            <a:avLst/>
+          </a:prstGeom>
+          <a:effectLst>
+            <a:outerShdw blurRad="254000" dist="50800" dir="5400000" sx="103000" sy="103000" algn="ctr" rotWithShape="0">
+              <a:srgbClr val="000000">
+                <a:alpha val="15000"/>
+              </a:srgbClr>
+            </a:outerShdw>
+          </a:effectLst>
+        </p:spPr>
+      </p:pic>
       <p:cxnSp>
         <p:nvCxnSpPr>
-          <p:cNvPr id="60" name="Прямая со стрелкой 59"/>
+          <p:cNvPr id="66" name="Прямая со стрелкой 65"/>
           <p:cNvCxnSpPr/>
           <p:nvPr/>
         </p:nvCxnSpPr>
@@ -10088,7 +9836,7 @@
       </p:cxnSp>
       <p:grpSp>
         <p:nvGrpSpPr>
-          <p:cNvPr id="30" name="Группа 29"/>
+          <p:cNvPr id="71" name="Группа 70"/>
           <p:cNvGrpSpPr/>
           <p:nvPr/>
         </p:nvGrpSpPr>
@@ -10102,7 +9850,7 @@
         </p:grpSpPr>
         <p:sp>
           <p:nvSpPr>
-            <p:cNvPr id="31" name="Овал 30"/>
+            <p:cNvPr id="75" name="Овал 74"/>
             <p:cNvSpPr/>
             <p:nvPr/>
           </p:nvSpPr>
@@ -10149,14 +9897,14 @@
         </p:sp>
         <p:pic>
           <p:nvPicPr>
-            <p:cNvPr id="32" name="Picture 5" descr="D:\Personal\Projects\Thesis\slides_icons\user_white.png"/>
+            <p:cNvPr id="76" name="Picture 5" descr="D:\Personal\Projects\Thesis\slides_icons\user_white.png"/>
             <p:cNvPicPr>
               <a:picLocks noChangeAspect="1" noChangeArrowheads="1"/>
             </p:cNvPicPr>
             <p:nvPr/>
           </p:nvPicPr>
           <p:blipFill>
-            <a:blip r:embed="rId4">
+            <a:blip r:embed="rId3">
               <a:extLst>
                 <a:ext uri="{28A0092B-C50C-407E-A947-70E740481C1C}">
                   <a14:useLocalDpi xmlns:a14="http://schemas.microsoft.com/office/drawing/2010/main" val="0"/>
@@ -10191,7 +9939,7 @@
       </p:grpSp>
       <p:cxnSp>
         <p:nvCxnSpPr>
-          <p:cNvPr id="69" name="Прямая соединительная линия 68"/>
+          <p:cNvPr id="77" name="Прямая соединительная линия 76"/>
           <p:cNvCxnSpPr/>
           <p:nvPr/>
         </p:nvCxnSpPr>
@@ -10228,7 +9976,7 @@
       </p:cxnSp>
       <p:grpSp>
         <p:nvGrpSpPr>
-          <p:cNvPr id="11" name="Группа 10"/>
+          <p:cNvPr id="78" name="Группа 77"/>
           <p:cNvGrpSpPr/>
           <p:nvPr/>
         </p:nvGrpSpPr>
@@ -10242,7 +9990,7 @@
         </p:grpSpPr>
         <p:sp>
           <p:nvSpPr>
-            <p:cNvPr id="12" name="Овал 11"/>
+            <p:cNvPr id="79" name="Овал 78"/>
             <p:cNvSpPr/>
             <p:nvPr/>
           </p:nvSpPr>
@@ -10288,14 +10036,14 @@
         </p:sp>
         <p:pic>
           <p:nvPicPr>
-            <p:cNvPr id="13" name="Picture 5" descr="D:\Personal\Projects\Thesis\slides_icons\box_white.png"/>
+            <p:cNvPr id="80" name="Picture 5" descr="D:\Personal\Projects\Thesis\slides_icons\box_white.png"/>
             <p:cNvPicPr>
               <a:picLocks noChangeAspect="1" noChangeArrowheads="1"/>
             </p:cNvPicPr>
             <p:nvPr/>
           </p:nvPicPr>
           <p:blipFill>
-            <a:blip r:embed="rId5">
+            <a:blip r:embed="rId4">
               <a:extLst>
                 <a:ext uri="{28A0092B-C50C-407E-A947-70E740481C1C}">
                   <a14:useLocalDpi xmlns:a14="http://schemas.microsoft.com/office/drawing/2010/main" val="0"/>
@@ -10330,7 +10078,7 @@
       </p:grpSp>
       <p:cxnSp>
         <p:nvCxnSpPr>
-          <p:cNvPr id="43" name="Прямая со стрелкой 42"/>
+          <p:cNvPr id="81" name="Прямая со стрелкой 80"/>
           <p:cNvCxnSpPr/>
           <p:nvPr/>
         </p:nvCxnSpPr>
@@ -10374,14 +10122,14 @@
       </p:cxnSp>
       <p:pic>
         <p:nvPicPr>
-          <p:cNvPr id="14" name="Picture 7" descr="D:\Personal\Projects\Thesis\slides_icons\tag.png"/>
+          <p:cNvPr id="82" name="Picture 7" descr="D:\Personal\Projects\Thesis\slides_icons\tag.png"/>
           <p:cNvPicPr>
             <a:picLocks noChangeAspect="1" noChangeArrowheads="1"/>
           </p:cNvPicPr>
           <p:nvPr/>
         </p:nvPicPr>
         <p:blipFill>
-          <a:blip r:embed="rId6">
+          <a:blip r:embed="rId5">
             <a:extLst>
               <a:ext uri="{28A0092B-C50C-407E-A947-70E740481C1C}">
                 <a14:useLocalDpi xmlns:a14="http://schemas.microsoft.com/office/drawing/2010/main" val="0"/>
@@ -10415,7 +10163,7 @@
       </p:pic>
       <p:cxnSp>
         <p:nvCxnSpPr>
-          <p:cNvPr id="44" name="Прямая со стрелкой 43"/>
+          <p:cNvPr id="83" name="Прямая со стрелкой 82"/>
           <p:cNvCxnSpPr/>
           <p:nvPr/>
         </p:nvCxnSpPr>
@@ -10459,14 +10207,14 @@
       </p:cxnSp>
       <p:pic>
         <p:nvPicPr>
-          <p:cNvPr id="21" name="Picture 7" descr="D:\Personal\Projects\Thesis\slides_icons\tag.png"/>
+          <p:cNvPr id="84" name="Picture 7" descr="D:\Personal\Projects\Thesis\slides_icons\tag.png"/>
           <p:cNvPicPr>
             <a:picLocks noChangeAspect="1" noChangeArrowheads="1"/>
           </p:cNvPicPr>
           <p:nvPr/>
         </p:nvPicPr>
         <p:blipFill>
-          <a:blip r:embed="rId6">
+          <a:blip r:embed="rId5">
             <a:extLst>
               <a:ext uri="{28A0092B-C50C-407E-A947-70E740481C1C}">
                 <a14:useLocalDpi xmlns:a14="http://schemas.microsoft.com/office/drawing/2010/main" val="0"/>
@@ -10500,7 +10248,7 @@
       </p:pic>
       <p:cxnSp>
         <p:nvCxnSpPr>
-          <p:cNvPr id="45" name="Прямая со стрелкой 44"/>
+          <p:cNvPr id="86" name="Прямая со стрелкой 85"/>
           <p:cNvCxnSpPr/>
           <p:nvPr/>
         </p:nvCxnSpPr>
@@ -10544,7 +10292,7 @@
       </p:cxnSp>
       <p:cxnSp>
         <p:nvCxnSpPr>
-          <p:cNvPr id="55" name="Прямая со стрелкой 54"/>
+          <p:cNvPr id="87" name="Прямая со стрелкой 86"/>
           <p:cNvCxnSpPr/>
           <p:nvPr/>
         </p:nvCxnSpPr>
@@ -10582,7 +10330,7 @@
       </p:cxnSp>
       <p:cxnSp>
         <p:nvCxnSpPr>
-          <p:cNvPr id="58" name="Прямая со стрелкой 57"/>
+          <p:cNvPr id="88" name="Прямая со стрелкой 87"/>
           <p:cNvCxnSpPr/>
           <p:nvPr/>
         </p:nvCxnSpPr>
@@ -10620,7 +10368,7 @@
       </p:cxnSp>
       <p:cxnSp>
         <p:nvCxnSpPr>
-          <p:cNvPr id="59" name="Прямая со стрелкой 58"/>
+          <p:cNvPr id="89" name="Прямая со стрелкой 88"/>
           <p:cNvCxnSpPr/>
           <p:nvPr/>
         </p:nvCxnSpPr>
@@ -10658,7 +10406,7 @@
       </p:cxnSp>
       <p:grpSp>
         <p:nvGrpSpPr>
-          <p:cNvPr id="46" name="Группа 45"/>
+          <p:cNvPr id="90" name="Группа 89"/>
           <p:cNvGrpSpPr/>
           <p:nvPr/>
         </p:nvGrpSpPr>
@@ -10672,7 +10420,7 @@
         </p:grpSpPr>
         <p:sp>
           <p:nvSpPr>
-            <p:cNvPr id="47" name="Овал 46"/>
+            <p:cNvPr id="91" name="Овал 90"/>
             <p:cNvSpPr/>
             <p:nvPr/>
           </p:nvSpPr>
@@ -10720,14 +10468,14 @@
         </p:sp>
         <p:pic>
           <p:nvPicPr>
-            <p:cNvPr id="48" name="Picture 4" descr="D:\Personal\Projects\Thesis\slides_icons\box.png"/>
+            <p:cNvPr id="92" name="Picture 4" descr="D:\Personal\Projects\Thesis\slides_icons\box.png"/>
             <p:cNvPicPr>
               <a:picLocks noChangeAspect="1" noChangeArrowheads="1"/>
             </p:cNvPicPr>
             <p:nvPr/>
           </p:nvPicPr>
           <p:blipFill>
-            <a:blip r:embed="rId7" cstate="print">
+            <a:blip r:embed="rId6" cstate="print">
               <a:extLst>
                 <a:ext uri="{28A0092B-C50C-407E-A947-70E740481C1C}">
                   <a14:useLocalDpi xmlns:a14="http://schemas.microsoft.com/office/drawing/2010/main" val="0"/>
@@ -10762,7 +10510,7 @@
       </p:grpSp>
       <p:grpSp>
         <p:nvGrpSpPr>
-          <p:cNvPr id="49" name="Группа 48"/>
+          <p:cNvPr id="93" name="Группа 92"/>
           <p:cNvGrpSpPr/>
           <p:nvPr/>
         </p:nvGrpSpPr>
@@ -10776,7 +10524,7 @@
         </p:grpSpPr>
         <p:sp>
           <p:nvSpPr>
-            <p:cNvPr id="50" name="Овал 49"/>
+            <p:cNvPr id="94" name="Овал 93"/>
             <p:cNvSpPr/>
             <p:nvPr/>
           </p:nvSpPr>
@@ -10824,14 +10572,14 @@
         </p:sp>
         <p:pic>
           <p:nvPicPr>
-            <p:cNvPr id="51" name="Picture 4" descr="D:\Personal\Projects\Thesis\slides_icons\box.png"/>
+            <p:cNvPr id="95" name="Picture 4" descr="D:\Personal\Projects\Thesis\slides_icons\box.png"/>
             <p:cNvPicPr>
               <a:picLocks noChangeAspect="1" noChangeArrowheads="1"/>
             </p:cNvPicPr>
             <p:nvPr/>
           </p:nvPicPr>
           <p:blipFill>
-            <a:blip r:embed="rId7" cstate="print">
+            <a:blip r:embed="rId6" cstate="print">
               <a:extLst>
                 <a:ext uri="{28A0092B-C50C-407E-A947-70E740481C1C}">
                   <a14:useLocalDpi xmlns:a14="http://schemas.microsoft.com/office/drawing/2010/main" val="0"/>
@@ -10866,7 +10614,7 @@
       </p:grpSp>
       <p:grpSp>
         <p:nvGrpSpPr>
-          <p:cNvPr id="52" name="Группа 51"/>
+          <p:cNvPr id="96" name="Группа 95"/>
           <p:cNvGrpSpPr/>
           <p:nvPr/>
         </p:nvGrpSpPr>
@@ -10880,7 +10628,7 @@
         </p:grpSpPr>
         <p:sp>
           <p:nvSpPr>
-            <p:cNvPr id="53" name="Овал 52"/>
+            <p:cNvPr id="97" name="Овал 96"/>
             <p:cNvSpPr/>
             <p:nvPr/>
           </p:nvSpPr>
@@ -10928,14 +10676,14 @@
         </p:sp>
         <p:pic>
           <p:nvPicPr>
-            <p:cNvPr id="54" name="Picture 4" descr="D:\Personal\Projects\Thesis\slides_icons\box.png"/>
+            <p:cNvPr id="98" name="Picture 4" descr="D:\Personal\Projects\Thesis\slides_icons\box.png"/>
             <p:cNvPicPr>
               <a:picLocks noChangeAspect="1" noChangeArrowheads="1"/>
             </p:cNvPicPr>
             <p:nvPr/>
           </p:nvPicPr>
           <p:blipFill>
-            <a:blip r:embed="rId7" cstate="print">
+            <a:blip r:embed="rId6" cstate="print">
               <a:extLst>
                 <a:ext uri="{28A0092B-C50C-407E-A947-70E740481C1C}">
                   <a14:useLocalDpi xmlns:a14="http://schemas.microsoft.com/office/drawing/2010/main" val="0"/>
@@ -10971,7 +10719,7 @@
     </p:spTree>
     <p:extLst>
       <p:ext uri="{BB962C8B-B14F-4D97-AF65-F5344CB8AC3E}">
-        <p14:creationId xmlns:p14="http://schemas.microsoft.com/office/powerpoint/2010/main" val="2813276655"/>
+        <p14:creationId xmlns:p14="http://schemas.microsoft.com/office/powerpoint/2010/main" val="3008935654"/>
       </p:ext>
     </p:extLst>
   </p:cSld>
@@ -11047,11 +10795,7 @@
           <a:p>
             <a:r>
               <a:rPr lang="ru-RU" dirty="0" smtClean="0"/>
-              <a:t>Функции </a:t>
-            </a:r>
-            <a:r>
-              <a:rPr lang="ru-RU" dirty="0" smtClean="0"/>
-              <a:t>сравнения</a:t>
+              <a:t>Функции сравнения</a:t>
             </a:r>
             <a:br>
               <a:rPr lang="ru-RU" dirty="0" smtClean="0"/>
@@ -11061,11 +10805,7 @@
           <a:p>
             <a:r>
               <a:rPr lang="ru-RU" dirty="0" smtClean="0"/>
-              <a:t>Алгоритмы </a:t>
-            </a:r>
-            <a:r>
-              <a:rPr lang="ru-RU" dirty="0" smtClean="0"/>
-              <a:t>поиска</a:t>
+              <a:t>Алгоритмы поиска</a:t>
             </a:r>
             <a:br>
               <a:rPr lang="ru-RU" dirty="0" smtClean="0"/>
@@ -11075,13 +10815,8 @@
           <a:p>
             <a:r>
               <a:rPr lang="ru-RU" dirty="0" smtClean="0"/>
-              <a:t>Качество </a:t>
+              <a:t>Качество описания объектов</a:t>
             </a:r>
-            <a:r>
-              <a:rPr lang="ru-RU" dirty="0" smtClean="0"/>
-              <a:t>описания объектов</a:t>
-            </a:r>
-            <a:endParaRPr lang="ru-RU" dirty="0" smtClean="0"/>
           </a:p>
           <a:p>
             <a:pPr lvl="1"/>
@@ -11089,7 +10824,6 @@
               <a:rPr lang="ru-RU" dirty="0" smtClean="0"/>
               <a:t>Анализ рецензий фильмов</a:t>
             </a:r>
-            <a:endParaRPr lang="ru-RU" dirty="0" smtClean="0"/>
           </a:p>
           <a:p>
             <a:pPr lvl="1"/>
@@ -11097,7 +10831,6 @@
               <a:rPr lang="ru-RU" dirty="0" smtClean="0"/>
               <a:t>Фильтрация пользовательских данных</a:t>
             </a:r>
-            <a:endParaRPr lang="ru-RU" dirty="0" smtClean="0"/>
           </a:p>
         </p:txBody>
       </p:sp>
@@ -11296,8 +11029,8 @@
           </a:p>
         </p:txBody>
       </p:sp>
-      <mc:AlternateContent xmlns:mc="http://schemas.openxmlformats.org/markup-compatibility/2006">
-        <mc:Choice xmlns:a14="http://schemas.microsoft.com/office/drawing/2010/main" Requires="a14">
+      <mc:AlternateContent xmlns:mc="http://schemas.openxmlformats.org/markup-compatibility/2006" xmlns:a14="http://schemas.microsoft.com/office/drawing/2010/main">
+        <mc:Choice Requires="a14">
           <p:sp>
             <p:nvSpPr>
               <p:cNvPr id="7" name="Объект 6"/>
@@ -11339,11 +11072,7 @@
                 </a:pPr>
                 <a:r>
                   <a:rPr lang="ru-RU" dirty="0" smtClean="0"/>
-                  <a:t>Точное </a:t>
-                </a:r>
-                <a:r>
-                  <a:rPr lang="ru-RU" dirty="0" smtClean="0"/>
-                  <a:t>значение </a:t>
+                  <a:t>На данный момент точное значение </a:t>
                 </a:r>
                 <a14:m>
                   <m:oMath xmlns:m="http://schemas.openxmlformats.org/officeDocument/2006/math">
@@ -11396,7 +11125,7 @@
             </p:txBody>
           </p:sp>
         </mc:Choice>
-        <mc:Fallback>
+        <mc:Fallback xmlns="">
           <p:sp>
             <p:nvSpPr>
               <p:cNvPr id="7" name="Объект 6"/>
@@ -11411,7 +11140,7 @@
               <a:blipFill rotWithShape="1">
                 <a:blip r:embed="rId3"/>
                 <a:stretch>
-                  <a:fillRect l="-1810" t="-1235"/>
+                  <a:fillRect l="-1810" t="-1235" r="-2413"/>
                 </a:stretch>
               </a:blipFill>
             </p:spPr>
@@ -11630,6 +11359,12 @@
             <a:r>
               <a:rPr lang="ru-RU" dirty="0" smtClean="0"/>
               <a:t>Фильтрация</a:t>
+            </a:r>
+          </a:p>
+          <a:p>
+            <a:r>
+              <a:rPr lang="ru-RU" dirty="0" smtClean="0"/>
+              <a:t>Поиск по критериям</a:t>
             </a:r>
             <a:endParaRPr lang="ru-RU" dirty="0"/>
           </a:p>
@@ -12082,11 +11817,7 @@
             </a:pPr>
             <a:r>
               <a:rPr lang="ru-RU" sz="2000" dirty="0" smtClean="0"/>
-              <a:t>Ограниченность </a:t>
-            </a:r>
-            <a:r>
-              <a:rPr lang="ru-RU" sz="2000" dirty="0" smtClean="0"/>
-              <a:t>анализа</a:t>
+              <a:t>Ограниченность анализа</a:t>
             </a:r>
             <a:br>
               <a:rPr lang="ru-RU" sz="2000" dirty="0" smtClean="0"/>
@@ -12103,11 +11834,7 @@
             </a:pPr>
             <a:r>
               <a:rPr lang="ru-RU" sz="2000" dirty="0" smtClean="0"/>
-              <a:t>Фиксированная предметная </a:t>
-            </a:r>
-            <a:r>
-              <a:rPr lang="ru-RU" sz="2000" dirty="0" smtClean="0"/>
-              <a:t>область</a:t>
+              <a:t>Фиксированная предметная область</a:t>
             </a:r>
             <a:br>
               <a:rPr lang="ru-RU" sz="2000" dirty="0" smtClean="0"/>
@@ -12956,11 +12683,7 @@
             </a:pPr>
             <a:r>
               <a:rPr lang="ru-RU" sz="2000" dirty="0" smtClean="0"/>
-              <a:t>Избирательность </a:t>
-            </a:r>
-            <a:r>
-              <a:rPr lang="ru-RU" sz="2000" dirty="0" smtClean="0"/>
-              <a:t>внимания</a:t>
+              <a:t>Избирательность внимания</a:t>
             </a:r>
             <a:br>
               <a:rPr lang="ru-RU" sz="2000" dirty="0" smtClean="0"/>
@@ -12979,7 +12702,6 @@
               <a:rPr lang="ru-RU" sz="2000" dirty="0" smtClean="0"/>
               <a:t>Ресурсоемкость</a:t>
             </a:r>
-            <a:endParaRPr lang="ru-RU" sz="2000" dirty="0" smtClean="0"/>
           </a:p>
         </p:txBody>
       </p:sp>
@@ -14128,11 +13850,7 @@
             </a:pPr>
             <a:r>
               <a:rPr lang="ru-RU" sz="2000" dirty="0" smtClean="0"/>
-              <a:t>Невозможность </a:t>
-            </a:r>
-            <a:r>
-              <a:rPr lang="ru-RU" sz="2000" dirty="0" smtClean="0"/>
-              <a:t>обоснования</a:t>
+              <a:t>Невозможность обоснования</a:t>
             </a:r>
             <a:br>
               <a:rPr lang="ru-RU" sz="2000" dirty="0" smtClean="0"/>
@@ -14149,11 +13867,7 @@
             </a:pPr>
             <a:r>
               <a:rPr lang="ru-RU" sz="2000" dirty="0" smtClean="0"/>
-              <a:t>Ручной подбор </a:t>
-            </a:r>
-            <a:r>
-              <a:rPr lang="ru-RU" sz="2000" dirty="0" smtClean="0"/>
-              <a:t>параметров</a:t>
+              <a:t>Ручной подбор параметров</a:t>
             </a:r>
           </a:p>
         </p:txBody>
@@ -18439,7 +18153,6 @@
             </a:bodyPr>
             <a:lstStyle/>
             <a:p>
-              <a:pPr/>
               <a:r>
                 <a:rPr lang="en-US" sz="3200" b="1" i="1" dirty="0" smtClean="0">
                   <a:latin typeface="Cambria Math" pitchFamily="18" charset="0"/>
@@ -18855,7 +18568,6 @@
             </a:bodyPr>
             <a:lstStyle/>
             <a:p>
-              <a:pPr/>
               <a:r>
                 <a:rPr lang="en-US" sz="3200" b="1" i="1" dirty="0" smtClean="0">
                   <a:latin typeface="Cambria Math" pitchFamily="18" charset="0"/>
@@ -19060,7 +18772,6 @@
             </a:bodyPr>
             <a:lstStyle/>
             <a:p>
-              <a:pPr/>
               <a:r>
                 <a:rPr lang="en-US" sz="3200" b="1" i="1" dirty="0" smtClean="0">
                   <a:latin typeface="Cambria Math" pitchFamily="18" charset="0"/>
@@ -19335,7 +19046,6 @@
             </a:bodyPr>
             <a:lstStyle/>
             <a:p>
-              <a:pPr/>
               <a:r>
                 <a:rPr lang="en-US" sz="3200" b="1" i="1" dirty="0" smtClean="0">
                   <a:latin typeface="Cambria Math" pitchFamily="18" charset="0"/>
@@ -19579,7 +19289,7 @@
         </p:nvSpPr>
         <p:spPr>
           <a:xfrm>
-            <a:off x="4482361" y="3670930"/>
+            <a:off x="4491647" y="3670930"/>
             <a:ext cx="966931" cy="461665"/>
           </a:xfrm>
           <a:prstGeom prst="rect">
@@ -19609,7 +19319,7 @@
         </p:nvSpPr>
         <p:spPr>
           <a:xfrm>
-            <a:off x="4174252" y="4028601"/>
+            <a:off x="4174252" y="4104017"/>
             <a:ext cx="1601721" cy="461665"/>
           </a:xfrm>
           <a:prstGeom prst="rect">
@@ -21220,6 +20930,11 @@
               <a:rPr lang="ru-RU" sz="2400" dirty="0" smtClean="0"/>
               <a:t>Сравнение</a:t>
             </a:r>
+            <a:r>
+              <a:rPr lang="ru-RU" sz="2400" dirty="0" smtClean="0"/>
+              <a:t>, фильтрация</a:t>
+            </a:r>
+            <a:endParaRPr lang="ru-RU" sz="2400" dirty="0" smtClean="0"/>
           </a:p>
           <a:p>
             <a:endParaRPr lang="ru-RU" dirty="0"/>
@@ -21386,7 +21101,7 @@
         </p:nvCxnSpPr>
         <p:spPr>
           <a:xfrm>
-            <a:off x="5940152" y="2564904"/>
+            <a:off x="5789320" y="2564904"/>
             <a:ext cx="394204" cy="810459"/>
           </a:xfrm>
           <a:prstGeom prst="straightConnector1">
@@ -21427,7 +21142,7 @@
         </p:nvCxnSpPr>
         <p:spPr>
           <a:xfrm flipH="1">
-            <a:off x="5652120" y="2564904"/>
+            <a:off x="5501288" y="2564904"/>
             <a:ext cx="288032" cy="810926"/>
           </a:xfrm>
           <a:prstGeom prst="straightConnector1">
@@ -21468,8 +21183,8 @@
         </p:nvCxnSpPr>
         <p:spPr>
           <a:xfrm flipH="1">
-            <a:off x="5826941" y="2585804"/>
-            <a:ext cx="1553371" cy="2406472"/>
+            <a:off x="5676109" y="2585804"/>
+            <a:ext cx="1921024" cy="2406472"/>
           </a:xfrm>
           <a:prstGeom prst="straightConnector1">
             <a:avLst/>
@@ -21505,8 +21220,8 @@
         </p:nvCxnSpPr>
         <p:spPr>
           <a:xfrm flipH="1">
-            <a:off x="6334356" y="2585804"/>
-            <a:ext cx="1045956" cy="789559"/>
+            <a:off x="6183524" y="2585804"/>
+            <a:ext cx="1413609" cy="789559"/>
           </a:xfrm>
           <a:prstGeom prst="straightConnector1">
             <a:avLst/>
@@ -21542,7 +21257,7 @@
         </p:nvCxnSpPr>
         <p:spPr>
           <a:xfrm>
-            <a:off x="8244408" y="2585804"/>
+            <a:off x="8461229" y="2585804"/>
             <a:ext cx="124062" cy="1271192"/>
           </a:xfrm>
           <a:prstGeom prst="straightConnector1">
@@ -21583,7 +21298,7 @@
         </p:nvCxnSpPr>
         <p:spPr>
           <a:xfrm>
-            <a:off x="7380312" y="2585804"/>
+            <a:off x="7597133" y="2585804"/>
             <a:ext cx="492055" cy="1282693"/>
           </a:xfrm>
           <a:prstGeom prst="straightConnector1">
@@ -21624,7 +21339,7 @@
         </p:nvCxnSpPr>
         <p:spPr>
           <a:xfrm>
-            <a:off x="5652120" y="3951894"/>
+            <a:off x="5501288" y="3951894"/>
             <a:ext cx="1038917" cy="1040378"/>
           </a:xfrm>
           <a:prstGeom prst="straightConnector1">
@@ -21665,7 +21380,7 @@
         </p:nvCxnSpPr>
         <p:spPr>
           <a:xfrm>
-            <a:off x="5652120" y="3951894"/>
+            <a:off x="5501288" y="3951894"/>
             <a:ext cx="174821" cy="1040382"/>
           </a:xfrm>
           <a:prstGeom prst="straightConnector1">
@@ -21706,8 +21421,8 @@
         </p:nvCxnSpPr>
         <p:spPr>
           <a:xfrm flipH="1">
-            <a:off x="6691037" y="2585804"/>
-            <a:ext cx="1553371" cy="2406468"/>
+            <a:off x="6540205" y="2585804"/>
+            <a:ext cx="1921024" cy="2406468"/>
           </a:xfrm>
           <a:prstGeom prst="straightConnector1">
             <a:avLst/>
@@ -21740,7 +21455,7 @@
         </p:nvGrpSpPr>
         <p:grpSpPr>
           <a:xfrm>
-            <a:off x="5652120" y="1988840"/>
+            <a:off x="5501288" y="1988840"/>
             <a:ext cx="576064" cy="576064"/>
             <a:chOff x="5172101" y="2009740"/>
             <a:chExt cx="576064" cy="576064"/>
@@ -21839,7 +21554,7 @@
         </p:nvGrpSpPr>
         <p:grpSpPr>
           <a:xfrm>
-            <a:off x="7092280" y="2009740"/>
+            <a:off x="7309101" y="2009740"/>
             <a:ext cx="576064" cy="576064"/>
             <a:chOff x="6948264" y="2009740"/>
             <a:chExt cx="576064" cy="576064"/>
@@ -21943,7 +21658,7 @@
         </p:nvGrpSpPr>
         <p:grpSpPr>
           <a:xfrm>
-            <a:off x="7956376" y="2009740"/>
+            <a:off x="8173197" y="2009740"/>
             <a:ext cx="576064" cy="576064"/>
             <a:chOff x="7884368" y="2009740"/>
             <a:chExt cx="576064" cy="576064"/>
@@ -22047,7 +21762,7 @@
         </p:nvGrpSpPr>
         <p:grpSpPr>
           <a:xfrm>
-            <a:off x="832889" y="3114014"/>
+            <a:off x="832889" y="3198857"/>
             <a:ext cx="3339239" cy="2043178"/>
             <a:chOff x="843454" y="2010076"/>
             <a:chExt cx="3339239" cy="2043178"/>
@@ -22927,7 +22642,7 @@
         </p:nvGrpSpPr>
         <p:grpSpPr>
           <a:xfrm>
-            <a:off x="6403005" y="4992272"/>
+            <a:off x="6252173" y="4992272"/>
             <a:ext cx="576064" cy="576064"/>
             <a:chOff x="5412637" y="5457222"/>
             <a:chExt cx="576064" cy="576064"/>
@@ -23029,7 +22744,7 @@
         </p:nvGrpSpPr>
         <p:grpSpPr>
           <a:xfrm>
-            <a:off x="5364088" y="3375830"/>
+            <a:off x="5213256" y="3375830"/>
             <a:ext cx="576064" cy="576064"/>
             <a:chOff x="4774386" y="3216974"/>
             <a:chExt cx="576064" cy="576064"/>
@@ -23131,7 +22846,7 @@
         </p:nvGrpSpPr>
         <p:grpSpPr>
           <a:xfrm>
-            <a:off x="8080438" y="3856996"/>
+            <a:off x="8297259" y="3856996"/>
             <a:ext cx="576064" cy="576064"/>
             <a:chOff x="5412637" y="5457222"/>
             <a:chExt cx="576064" cy="576064"/>
@@ -23233,7 +22948,7 @@
         </p:nvGrpSpPr>
         <p:grpSpPr>
           <a:xfrm>
-            <a:off x="7584335" y="3868497"/>
+            <a:off x="7801156" y="3868497"/>
             <a:ext cx="576064" cy="576064"/>
             <a:chOff x="5412637" y="5457222"/>
             <a:chExt cx="576064" cy="576064"/>
@@ -23335,7 +23050,7 @@
         </p:nvGrpSpPr>
         <p:grpSpPr>
           <a:xfrm>
-            <a:off x="5538909" y="4992276"/>
+            <a:off x="5388077" y="4992276"/>
             <a:ext cx="576064" cy="576064"/>
             <a:chOff x="5412637" y="5457222"/>
             <a:chExt cx="576064" cy="576064"/>
@@ -23437,7 +23152,7 @@
         </p:nvGrpSpPr>
         <p:grpSpPr>
           <a:xfrm>
-            <a:off x="6046324" y="3375363"/>
+            <a:off x="5895492" y="3375363"/>
             <a:ext cx="576064" cy="576064"/>
             <a:chOff x="5412637" y="5457222"/>
             <a:chExt cx="576064" cy="576064"/>
@@ -23531,8 +23246,8 @@
           </p:spPr>
         </p:pic>
       </p:grpSp>
-      <mc:AlternateContent xmlns:mc="http://schemas.openxmlformats.org/markup-compatibility/2006">
-        <mc:Choice xmlns:a14="http://schemas.microsoft.com/office/drawing/2010/main" Requires="a14">
+      <mc:AlternateContent xmlns:mc="http://schemas.openxmlformats.org/markup-compatibility/2006" xmlns:a14="http://schemas.microsoft.com/office/drawing/2010/main">
+        <mc:Choice Requires="a14">
           <p:sp>
             <p:nvSpPr>
               <p:cNvPr id="125" name="TextBox 124"/>
@@ -23669,7 +23384,7 @@
             </p:txBody>
           </p:sp>
         </mc:Choice>
-        <mc:Fallback>
+        <mc:Fallback xmlns="">
           <p:sp>
             <p:nvSpPr>
               <p:cNvPr id="125" name="TextBox 124"/>
@@ -23745,6 +23460,190 @@
           </a:fontRef>
         </p:style>
       </p:cxnSp>
+      <p:sp>
+        <p:nvSpPr>
+          <p:cNvPr id="73" name="Овал 72"/>
+          <p:cNvSpPr/>
+          <p:nvPr/>
+        </p:nvSpPr>
+        <p:spPr>
+          <a:xfrm>
+            <a:off x="7136031" y="3527970"/>
+            <a:ext cx="216000" cy="216000"/>
+          </a:xfrm>
+          <a:prstGeom prst="ellipse">
+            <a:avLst/>
+          </a:prstGeom>
+          <a:solidFill>
+            <a:schemeClr val="tx1"/>
+          </a:solidFill>
+          <a:ln>
+            <a:noFill/>
+          </a:ln>
+        </p:spPr>
+        <p:style>
+          <a:lnRef idx="2">
+            <a:schemeClr val="accent3">
+              <a:shade val="50000"/>
+            </a:schemeClr>
+          </a:lnRef>
+          <a:fillRef idx="1">
+            <a:schemeClr val="accent3"/>
+          </a:fillRef>
+          <a:effectRef idx="0">
+            <a:schemeClr val="accent3"/>
+          </a:effectRef>
+          <a:fontRef idx="minor">
+            <a:schemeClr val="lt1"/>
+          </a:fontRef>
+        </p:style>
+        <p:txBody>
+          <a:bodyPr rtlCol="0" anchor="ctr"/>
+          <a:lstStyle/>
+          <a:p>
+            <a:pPr algn="ctr"/>
+            <a:r>
+              <a:rPr lang="en-US" sz="1200" b="1" dirty="0" smtClean="0"/>
+              <a:t>2</a:t>
+            </a:r>
+            <a:endParaRPr lang="ru-RU" sz="1200" b="1" dirty="0"/>
+          </a:p>
+        </p:txBody>
+      </p:sp>
+      <p:sp>
+        <p:nvSpPr>
+          <p:cNvPr id="83" name="Овал 82"/>
+          <p:cNvSpPr/>
+          <p:nvPr/>
+        </p:nvSpPr>
+        <p:spPr>
+          <a:xfrm>
+            <a:off x="5354105" y="2862133"/>
+            <a:ext cx="216000" cy="216000"/>
+          </a:xfrm>
+          <a:prstGeom prst="ellipse">
+            <a:avLst/>
+          </a:prstGeom>
+          <a:solidFill>
+            <a:schemeClr val="tx1"/>
+          </a:solidFill>
+          <a:ln>
+            <a:noFill/>
+          </a:ln>
+        </p:spPr>
+        <p:style>
+          <a:lnRef idx="2">
+            <a:schemeClr val="accent3">
+              <a:shade val="50000"/>
+            </a:schemeClr>
+          </a:lnRef>
+          <a:fillRef idx="1">
+            <a:schemeClr val="accent3"/>
+          </a:fillRef>
+          <a:effectRef idx="0">
+            <a:schemeClr val="accent3"/>
+          </a:effectRef>
+          <a:fontRef idx="minor">
+            <a:schemeClr val="lt1"/>
+          </a:fontRef>
+        </p:style>
+        <p:txBody>
+          <a:bodyPr rtlCol="0" anchor="ctr"/>
+          <a:lstStyle/>
+          <a:p>
+            <a:pPr algn="ctr"/>
+            <a:r>
+              <a:rPr lang="en-US" sz="1200" b="1" dirty="0" smtClean="0"/>
+              <a:t>1</a:t>
+            </a:r>
+            <a:endParaRPr lang="ru-RU" sz="1200" b="1" dirty="0"/>
+          </a:p>
+        </p:txBody>
+      </p:sp>
+      <p:cxnSp>
+        <p:nvCxnSpPr>
+          <p:cNvPr id="85" name="Прямая со стрелкой 84"/>
+          <p:cNvCxnSpPr/>
+          <p:nvPr/>
+        </p:nvCxnSpPr>
+        <p:spPr>
+          <a:xfrm flipH="1">
+            <a:off x="6291586" y="2252668"/>
+            <a:ext cx="740748" cy="0"/>
+          </a:xfrm>
+          <a:prstGeom prst="straightConnector1">
+            <a:avLst/>
+          </a:prstGeom>
+          <a:ln w="19050">
+            <a:prstDash val="sysDot"/>
+            <a:tailEnd type="arrow"/>
+          </a:ln>
+        </p:spPr>
+        <p:style>
+          <a:lnRef idx="1">
+            <a:schemeClr val="dk1"/>
+          </a:lnRef>
+          <a:fillRef idx="0">
+            <a:schemeClr val="dk1"/>
+          </a:fillRef>
+          <a:effectRef idx="0">
+            <a:schemeClr val="dk1"/>
+          </a:effectRef>
+          <a:fontRef idx="minor">
+            <a:schemeClr val="tx1"/>
+          </a:fontRef>
+        </p:style>
+      </p:cxnSp>
+      <p:sp>
+        <p:nvSpPr>
+          <p:cNvPr id="90" name="Овал 89"/>
+          <p:cNvSpPr/>
+          <p:nvPr/>
+        </p:nvSpPr>
+        <p:spPr>
+          <a:xfrm>
+            <a:off x="6589011" y="1986583"/>
+            <a:ext cx="216000" cy="216000"/>
+          </a:xfrm>
+          <a:prstGeom prst="ellipse">
+            <a:avLst/>
+          </a:prstGeom>
+          <a:solidFill>
+            <a:schemeClr val="tx1"/>
+          </a:solidFill>
+          <a:ln>
+            <a:noFill/>
+          </a:ln>
+        </p:spPr>
+        <p:style>
+          <a:lnRef idx="2">
+            <a:schemeClr val="accent3">
+              <a:shade val="50000"/>
+            </a:schemeClr>
+          </a:lnRef>
+          <a:fillRef idx="1">
+            <a:schemeClr val="accent3"/>
+          </a:fillRef>
+          <a:effectRef idx="0">
+            <a:schemeClr val="accent3"/>
+          </a:effectRef>
+          <a:fontRef idx="minor">
+            <a:schemeClr val="lt1"/>
+          </a:fontRef>
+        </p:style>
+        <p:txBody>
+          <a:bodyPr rtlCol="0" anchor="ctr"/>
+          <a:lstStyle/>
+          <a:p>
+            <a:pPr algn="ctr"/>
+            <a:r>
+              <a:rPr lang="en-US" sz="1200" b="1" dirty="0"/>
+              <a:t>3</a:t>
+            </a:r>
+            <a:endParaRPr lang="ru-RU" sz="1200" b="1" dirty="0"/>
+          </a:p>
+        </p:txBody>
+      </p:sp>
     </p:spTree>
     <p:extLst>
       <p:ext uri="{BB962C8B-B14F-4D97-AF65-F5344CB8AC3E}">

</xml_diff>